<commit_message>
Make the advice heading smaller.
</commit_message>
<xml_diff>
--- a/ImagesForSlides.pptx
+++ b/ImagesForSlides.pptx
@@ -8,13 +8,15 @@
     <p:sldId id="256" r:id="rId2"/>
     <p:sldId id="258" r:id="rId3"/>
     <p:sldId id="267" r:id="rId4"/>
-    <p:sldId id="266" r:id="rId5"/>
-    <p:sldId id="259" r:id="rId6"/>
-    <p:sldId id="260" r:id="rId7"/>
-    <p:sldId id="261" r:id="rId8"/>
-    <p:sldId id="262" r:id="rId9"/>
-    <p:sldId id="263" r:id="rId10"/>
-    <p:sldId id="264" r:id="rId11"/>
+    <p:sldId id="268" r:id="rId5"/>
+    <p:sldId id="269" r:id="rId6"/>
+    <p:sldId id="266" r:id="rId7"/>
+    <p:sldId id="259" r:id="rId8"/>
+    <p:sldId id="260" r:id="rId9"/>
+    <p:sldId id="261" r:id="rId10"/>
+    <p:sldId id="262" r:id="rId11"/>
+    <p:sldId id="263" r:id="rId12"/>
+    <p:sldId id="264" r:id="rId13"/>
   </p:sldIdLst>
   <p:sldSz cx="12192000" cy="6858000"/>
   <p:notesSz cx="6858000" cy="9144000"/>
@@ -270,7 +272,7 @@
           <a:p>
             <a:fld id="{159BB974-4163-415D-8C8C-F52927F6B0B2}" type="datetimeFigureOut">
               <a:rPr lang="en-SG" smtClean="0"/>
-              <a:t>20/10/2021</a:t>
+              <a:t>26/10/2021</a:t>
             </a:fld>
             <a:endParaRPr lang="en-SG"/>
           </a:p>
@@ -470,7 +472,7 @@
           <a:p>
             <a:fld id="{159BB974-4163-415D-8C8C-F52927F6B0B2}" type="datetimeFigureOut">
               <a:rPr lang="en-SG" smtClean="0"/>
-              <a:t>20/10/2021</a:t>
+              <a:t>26/10/2021</a:t>
             </a:fld>
             <a:endParaRPr lang="en-SG"/>
           </a:p>
@@ -680,7 +682,7 @@
           <a:p>
             <a:fld id="{159BB974-4163-415D-8C8C-F52927F6B0B2}" type="datetimeFigureOut">
               <a:rPr lang="en-SG" smtClean="0"/>
-              <a:t>20/10/2021</a:t>
+              <a:t>26/10/2021</a:t>
             </a:fld>
             <a:endParaRPr lang="en-SG"/>
           </a:p>
@@ -880,7 +882,7 @@
           <a:p>
             <a:fld id="{159BB974-4163-415D-8C8C-F52927F6B0B2}" type="datetimeFigureOut">
               <a:rPr lang="en-SG" smtClean="0"/>
-              <a:t>20/10/2021</a:t>
+              <a:t>26/10/2021</a:t>
             </a:fld>
             <a:endParaRPr lang="en-SG"/>
           </a:p>
@@ -1156,7 +1158,7 @@
           <a:p>
             <a:fld id="{159BB974-4163-415D-8C8C-F52927F6B0B2}" type="datetimeFigureOut">
               <a:rPr lang="en-SG" smtClean="0"/>
-              <a:t>20/10/2021</a:t>
+              <a:t>26/10/2021</a:t>
             </a:fld>
             <a:endParaRPr lang="en-SG"/>
           </a:p>
@@ -1424,7 +1426,7 @@
           <a:p>
             <a:fld id="{159BB974-4163-415D-8C8C-F52927F6B0B2}" type="datetimeFigureOut">
               <a:rPr lang="en-SG" smtClean="0"/>
-              <a:t>20/10/2021</a:t>
+              <a:t>26/10/2021</a:t>
             </a:fld>
             <a:endParaRPr lang="en-SG"/>
           </a:p>
@@ -1839,7 +1841,7 @@
           <a:p>
             <a:fld id="{159BB974-4163-415D-8C8C-F52927F6B0B2}" type="datetimeFigureOut">
               <a:rPr lang="en-SG" smtClean="0"/>
-              <a:t>20/10/2021</a:t>
+              <a:t>26/10/2021</a:t>
             </a:fld>
             <a:endParaRPr lang="en-SG"/>
           </a:p>
@@ -1981,7 +1983,7 @@
           <a:p>
             <a:fld id="{159BB974-4163-415D-8C8C-F52927F6B0B2}" type="datetimeFigureOut">
               <a:rPr lang="en-SG" smtClean="0"/>
-              <a:t>20/10/2021</a:t>
+              <a:t>26/10/2021</a:t>
             </a:fld>
             <a:endParaRPr lang="en-SG"/>
           </a:p>
@@ -2094,7 +2096,7 @@
           <a:p>
             <a:fld id="{159BB974-4163-415D-8C8C-F52927F6B0B2}" type="datetimeFigureOut">
               <a:rPr lang="en-SG" smtClean="0"/>
-              <a:t>20/10/2021</a:t>
+              <a:t>26/10/2021</a:t>
             </a:fld>
             <a:endParaRPr lang="en-SG"/>
           </a:p>
@@ -2407,7 +2409,7 @@
           <a:p>
             <a:fld id="{159BB974-4163-415D-8C8C-F52927F6B0B2}" type="datetimeFigureOut">
               <a:rPr lang="en-SG" smtClean="0"/>
-              <a:t>20/10/2021</a:t>
+              <a:t>26/10/2021</a:t>
             </a:fld>
             <a:endParaRPr lang="en-SG"/>
           </a:p>
@@ -2696,7 +2698,7 @@
           <a:p>
             <a:fld id="{159BB974-4163-415D-8C8C-F52927F6B0B2}" type="datetimeFigureOut">
               <a:rPr lang="en-SG" smtClean="0"/>
-              <a:t>20/10/2021</a:t>
+              <a:t>26/10/2021</a:t>
             </a:fld>
             <a:endParaRPr lang="en-SG"/>
           </a:p>
@@ -2939,7 +2941,7 @@
           <a:p>
             <a:fld id="{159BB974-4163-415D-8C8C-F52927F6B0B2}" type="datetimeFigureOut">
               <a:rPr lang="en-SG" smtClean="0"/>
-              <a:t>20/10/2021</a:t>
+              <a:t>26/10/2021</a:t>
             </a:fld>
             <a:endParaRPr lang="en-SG"/>
           </a:p>
@@ -3436,6 +3438,947 @@
           <a:chExt cx="0" cy="0"/>
         </a:xfrm>
       </p:grpSpPr>
+      <p:grpSp>
+        <p:nvGrpSpPr>
+          <p:cNvPr id="57" name="Group 56">
+            <a:extLst>
+              <a:ext uri="{FF2B5EF4-FFF2-40B4-BE49-F238E27FC236}">
+                <a16:creationId xmlns:a16="http://schemas.microsoft.com/office/drawing/2014/main" id="{BCCB7538-95CD-4ED8-8760-D7FB21C83BA2}"/>
+              </a:ext>
+            </a:extLst>
+          </p:cNvPr>
+          <p:cNvGrpSpPr/>
+          <p:nvPr/>
+        </p:nvGrpSpPr>
+        <p:grpSpPr>
+          <a:xfrm>
+            <a:off x="361367" y="248825"/>
+            <a:ext cx="11504061" cy="5336996"/>
+            <a:chOff x="361367" y="248825"/>
+            <a:chExt cx="11504061" cy="5336996"/>
+          </a:xfrm>
+        </p:grpSpPr>
+        <p:pic>
+          <p:nvPicPr>
+            <p:cNvPr id="10" name="Picture 9">
+              <a:extLst>
+                <a:ext uri="{FF2B5EF4-FFF2-40B4-BE49-F238E27FC236}">
+                  <a16:creationId xmlns:a16="http://schemas.microsoft.com/office/drawing/2014/main" id="{36DADDEF-470D-4D10-80FF-455ABD0C014A}"/>
+                </a:ext>
+              </a:extLst>
+            </p:cNvPr>
+            <p:cNvPicPr>
+              <a:picLocks noChangeAspect="1"/>
+            </p:cNvPicPr>
+            <p:nvPr/>
+          </p:nvPicPr>
+          <p:blipFill>
+            <a:blip r:embed="rId2"/>
+            <a:stretch>
+              <a:fillRect/>
+            </a:stretch>
+          </p:blipFill>
+          <p:spPr>
+            <a:xfrm>
+              <a:off x="1431925" y="2387086"/>
+              <a:ext cx="2886075" cy="361950"/>
+            </a:xfrm>
+            <a:prstGeom prst="rect">
+              <a:avLst/>
+            </a:prstGeom>
+          </p:spPr>
+        </p:pic>
+        <p:sp>
+          <p:nvSpPr>
+            <p:cNvPr id="11" name="TextBox 10">
+              <a:extLst>
+                <a:ext uri="{FF2B5EF4-FFF2-40B4-BE49-F238E27FC236}">
+                  <a16:creationId xmlns:a16="http://schemas.microsoft.com/office/drawing/2014/main" id="{ECF5BEF1-64E7-40F0-BFB5-BF82F1DC814C}"/>
+                </a:ext>
+              </a:extLst>
+            </p:cNvPr>
+            <p:cNvSpPr txBox="1"/>
+            <p:nvPr/>
+          </p:nvSpPr>
+          <p:spPr>
+            <a:xfrm>
+              <a:off x="5817340" y="3347903"/>
+              <a:ext cx="1078992" cy="369332"/>
+            </a:xfrm>
+            <a:prstGeom prst="rect">
+              <a:avLst/>
+            </a:prstGeom>
+            <a:noFill/>
+          </p:spPr>
+          <p:txBody>
+            <a:bodyPr wrap="square" rtlCol="0">
+              <a:spAutoFit/>
+            </a:bodyPr>
+            <a:lstStyle/>
+            <a:p>
+              <a:pPr algn="ctr"/>
+              <a:r>
+                <a:rPr lang="en-SG" dirty="0"/>
+                <a:t>equals</a:t>
+              </a:r>
+            </a:p>
+          </p:txBody>
+        </p:sp>
+        <p:pic>
+          <p:nvPicPr>
+            <p:cNvPr id="15" name="Picture 14">
+              <a:extLst>
+                <a:ext uri="{FF2B5EF4-FFF2-40B4-BE49-F238E27FC236}">
+                  <a16:creationId xmlns:a16="http://schemas.microsoft.com/office/drawing/2014/main" id="{36289DBE-5F83-4978-AC1F-5080B647A643}"/>
+                </a:ext>
+              </a:extLst>
+            </p:cNvPr>
+            <p:cNvPicPr>
+              <a:picLocks noChangeAspect="1"/>
+            </p:cNvPicPr>
+            <p:nvPr/>
+          </p:nvPicPr>
+          <p:blipFill>
+            <a:blip r:embed="rId3">
+              <a:extLst>
+                <a:ext uri="{28A0092B-C50C-407E-A947-70E740481C1C}">
+                  <a14:useLocalDpi xmlns:a14="http://schemas.microsoft.com/office/drawing/2010/main" val="0"/>
+                </a:ext>
+              </a:extLst>
+            </a:blip>
+            <a:stretch>
+              <a:fillRect/>
+            </a:stretch>
+          </p:blipFill>
+          <p:spPr>
+            <a:xfrm>
+              <a:off x="1352310" y="248825"/>
+              <a:ext cx="3583242" cy="1048754"/>
+            </a:xfrm>
+            <a:prstGeom prst="rect">
+              <a:avLst/>
+            </a:prstGeom>
+          </p:spPr>
+        </p:pic>
+        <p:sp>
+          <p:nvSpPr>
+            <p:cNvPr id="16" name="Rectangle 15">
+              <a:extLst>
+                <a:ext uri="{FF2B5EF4-FFF2-40B4-BE49-F238E27FC236}">
+                  <a16:creationId xmlns:a16="http://schemas.microsoft.com/office/drawing/2014/main" id="{9BB992B6-E49B-45DB-8B30-36AAD9504F4D}"/>
+                </a:ext>
+              </a:extLst>
+            </p:cNvPr>
+            <p:cNvSpPr/>
+            <p:nvPr/>
+          </p:nvSpPr>
+          <p:spPr>
+            <a:xfrm>
+              <a:off x="3463227" y="2451094"/>
+              <a:ext cx="694944" cy="217066"/>
+            </a:xfrm>
+            <a:prstGeom prst="rect">
+              <a:avLst/>
+            </a:prstGeom>
+            <a:noFill/>
+            <a:ln w="28575">
+              <a:solidFill>
+                <a:srgbClr val="FF66FF"/>
+              </a:solidFill>
+            </a:ln>
+          </p:spPr>
+          <p:style>
+            <a:lnRef idx="2">
+              <a:schemeClr val="accent1">
+                <a:shade val="50000"/>
+              </a:schemeClr>
+            </a:lnRef>
+            <a:fillRef idx="1">
+              <a:schemeClr val="accent1"/>
+            </a:fillRef>
+            <a:effectRef idx="0">
+              <a:schemeClr val="accent1"/>
+            </a:effectRef>
+            <a:fontRef idx="minor">
+              <a:schemeClr val="lt1"/>
+            </a:fontRef>
+          </p:style>
+          <p:txBody>
+            <a:bodyPr rtlCol="0" anchor="ctr"/>
+            <a:lstStyle/>
+            <a:p>
+              <a:pPr algn="ctr"/>
+              <a:endParaRPr lang="en-SG">
+                <a:solidFill>
+                  <a:srgbClr val="FF66FF"/>
+                </a:solidFill>
+              </a:endParaRPr>
+            </a:p>
+          </p:txBody>
+        </p:sp>
+        <p:pic>
+          <p:nvPicPr>
+            <p:cNvPr id="3" name="Picture 2">
+              <a:extLst>
+                <a:ext uri="{FF2B5EF4-FFF2-40B4-BE49-F238E27FC236}">
+                  <a16:creationId xmlns:a16="http://schemas.microsoft.com/office/drawing/2014/main" id="{E8B70E49-69BA-451F-B783-110E481BFDE2}"/>
+                </a:ext>
+              </a:extLst>
+            </p:cNvPr>
+            <p:cNvPicPr>
+              <a:picLocks noChangeAspect="1"/>
+            </p:cNvPicPr>
+            <p:nvPr/>
+          </p:nvPicPr>
+          <p:blipFill>
+            <a:blip r:embed="rId4"/>
+            <a:stretch>
+              <a:fillRect/>
+            </a:stretch>
+          </p:blipFill>
+          <p:spPr>
+            <a:xfrm>
+              <a:off x="361367" y="2856927"/>
+              <a:ext cx="5353050" cy="1809750"/>
+            </a:xfrm>
+            <a:prstGeom prst="rect">
+              <a:avLst/>
+            </a:prstGeom>
+          </p:spPr>
+        </p:pic>
+        <p:pic>
+          <p:nvPicPr>
+            <p:cNvPr id="5" name="Picture 4">
+              <a:extLst>
+                <a:ext uri="{FF2B5EF4-FFF2-40B4-BE49-F238E27FC236}">
+                  <a16:creationId xmlns:a16="http://schemas.microsoft.com/office/drawing/2014/main" id="{FD8D545B-D184-4048-AEB9-EE398BF09053}"/>
+                </a:ext>
+              </a:extLst>
+            </p:cNvPr>
+            <p:cNvPicPr>
+              <a:picLocks noChangeAspect="1"/>
+            </p:cNvPicPr>
+            <p:nvPr/>
+          </p:nvPicPr>
+          <p:blipFill>
+            <a:blip r:embed="rId5"/>
+            <a:stretch>
+              <a:fillRect/>
+            </a:stretch>
+          </p:blipFill>
+          <p:spPr>
+            <a:xfrm>
+              <a:off x="7777375" y="248825"/>
+              <a:ext cx="3589069" cy="1048754"/>
+            </a:xfrm>
+            <a:prstGeom prst="rect">
+              <a:avLst/>
+            </a:prstGeom>
+          </p:spPr>
+        </p:pic>
+        <p:pic>
+          <p:nvPicPr>
+            <p:cNvPr id="9" name="Picture 8">
+              <a:extLst>
+                <a:ext uri="{FF2B5EF4-FFF2-40B4-BE49-F238E27FC236}">
+                  <a16:creationId xmlns:a16="http://schemas.microsoft.com/office/drawing/2014/main" id="{FCC9DCB3-60E2-4D2C-8EC1-B1053102A16D}"/>
+                </a:ext>
+              </a:extLst>
+            </p:cNvPr>
+            <p:cNvPicPr>
+              <a:picLocks noChangeAspect="1"/>
+            </p:cNvPicPr>
+            <p:nvPr/>
+          </p:nvPicPr>
+          <p:blipFill>
+            <a:blip r:embed="rId6"/>
+            <a:stretch>
+              <a:fillRect/>
+            </a:stretch>
+          </p:blipFill>
+          <p:spPr>
+            <a:xfrm>
+              <a:off x="7143652" y="3945351"/>
+              <a:ext cx="4721776" cy="1640470"/>
+            </a:xfrm>
+            <a:prstGeom prst="rect">
+              <a:avLst/>
+            </a:prstGeom>
+            <a:ln w="38100">
+              <a:solidFill>
+                <a:srgbClr val="FF66FF"/>
+              </a:solidFill>
+            </a:ln>
+          </p:spPr>
+        </p:pic>
+        <p:pic>
+          <p:nvPicPr>
+            <p:cNvPr id="12" name="Picture 11">
+              <a:extLst>
+                <a:ext uri="{FF2B5EF4-FFF2-40B4-BE49-F238E27FC236}">
+                  <a16:creationId xmlns:a16="http://schemas.microsoft.com/office/drawing/2014/main" id="{FB95CB6C-0967-48AB-8207-EBB0D074BA27}"/>
+                </a:ext>
+              </a:extLst>
+            </p:cNvPr>
+            <p:cNvPicPr>
+              <a:picLocks noChangeAspect="1"/>
+            </p:cNvPicPr>
+            <p:nvPr/>
+          </p:nvPicPr>
+          <p:blipFill>
+            <a:blip r:embed="rId7"/>
+            <a:stretch>
+              <a:fillRect/>
+            </a:stretch>
+          </p:blipFill>
+          <p:spPr>
+            <a:xfrm>
+              <a:off x="7143652" y="1571396"/>
+              <a:ext cx="4686981" cy="1631380"/>
+            </a:xfrm>
+            <a:prstGeom prst="rect">
+              <a:avLst/>
+            </a:prstGeom>
+          </p:spPr>
+        </p:pic>
+        <p:sp>
+          <p:nvSpPr>
+            <p:cNvPr id="13" name="Rectangle 12">
+              <a:extLst>
+                <a:ext uri="{FF2B5EF4-FFF2-40B4-BE49-F238E27FC236}">
+                  <a16:creationId xmlns:a16="http://schemas.microsoft.com/office/drawing/2014/main" id="{BD136409-3B82-4B65-A9A9-6A694EC94597}"/>
+                </a:ext>
+              </a:extLst>
+            </p:cNvPr>
+            <p:cNvSpPr/>
+            <p:nvPr/>
+          </p:nvSpPr>
+          <p:spPr>
+            <a:xfrm>
+              <a:off x="10511959" y="1571396"/>
+              <a:ext cx="1318673" cy="1375004"/>
+            </a:xfrm>
+            <a:prstGeom prst="rect">
+              <a:avLst/>
+            </a:prstGeom>
+            <a:noFill/>
+            <a:ln w="28575">
+              <a:solidFill>
+                <a:schemeClr val="accent4">
+                  <a:lumMod val="75000"/>
+                </a:schemeClr>
+              </a:solidFill>
+            </a:ln>
+          </p:spPr>
+          <p:style>
+            <a:lnRef idx="2">
+              <a:schemeClr val="accent1">
+                <a:shade val="50000"/>
+              </a:schemeClr>
+            </a:lnRef>
+            <a:fillRef idx="1">
+              <a:schemeClr val="accent1"/>
+            </a:fillRef>
+            <a:effectRef idx="0">
+              <a:schemeClr val="accent1"/>
+            </a:effectRef>
+            <a:fontRef idx="minor">
+              <a:schemeClr val="lt1"/>
+            </a:fontRef>
+          </p:style>
+          <p:txBody>
+            <a:bodyPr rtlCol="0" anchor="ctr"/>
+            <a:lstStyle/>
+            <a:p>
+              <a:pPr algn="ctr"/>
+              <a:endParaRPr lang="en-SG"/>
+            </a:p>
+          </p:txBody>
+        </p:sp>
+        <p:sp>
+          <p:nvSpPr>
+            <p:cNvPr id="18" name="Rectangle 17">
+              <a:extLst>
+                <a:ext uri="{FF2B5EF4-FFF2-40B4-BE49-F238E27FC236}">
+                  <a16:creationId xmlns:a16="http://schemas.microsoft.com/office/drawing/2014/main" id="{975AC692-014B-4EF3-AAB4-5F5632C09598}"/>
+                </a:ext>
+              </a:extLst>
+            </p:cNvPr>
+            <p:cNvSpPr/>
+            <p:nvPr/>
+          </p:nvSpPr>
+          <p:spPr>
+            <a:xfrm>
+              <a:off x="3207657" y="928914"/>
+              <a:ext cx="1226286" cy="246743"/>
+            </a:xfrm>
+            <a:prstGeom prst="rect">
+              <a:avLst/>
+            </a:prstGeom>
+            <a:noFill/>
+            <a:ln w="28575">
+              <a:solidFill>
+                <a:srgbClr val="FF66FF"/>
+              </a:solidFill>
+            </a:ln>
+          </p:spPr>
+          <p:style>
+            <a:lnRef idx="2">
+              <a:schemeClr val="accent1">
+                <a:shade val="50000"/>
+              </a:schemeClr>
+            </a:lnRef>
+            <a:fillRef idx="1">
+              <a:schemeClr val="accent1"/>
+            </a:fillRef>
+            <a:effectRef idx="0">
+              <a:schemeClr val="accent1"/>
+            </a:effectRef>
+            <a:fontRef idx="minor">
+              <a:schemeClr val="lt1"/>
+            </a:fontRef>
+          </p:style>
+          <p:txBody>
+            <a:bodyPr rtlCol="0" anchor="ctr"/>
+            <a:lstStyle/>
+            <a:p>
+              <a:pPr algn="ctr"/>
+              <a:endParaRPr lang="en-SG">
+                <a:solidFill>
+                  <a:srgbClr val="FF66FF"/>
+                </a:solidFill>
+              </a:endParaRPr>
+            </a:p>
+          </p:txBody>
+        </p:sp>
+        <p:cxnSp>
+          <p:nvCxnSpPr>
+            <p:cNvPr id="20" name="Straight Arrow Connector 19">
+              <a:extLst>
+                <a:ext uri="{FF2B5EF4-FFF2-40B4-BE49-F238E27FC236}">
+                  <a16:creationId xmlns:a16="http://schemas.microsoft.com/office/drawing/2014/main" id="{9CAD71E1-606A-4381-8051-B08D2AB48614}"/>
+                </a:ext>
+              </a:extLst>
+            </p:cNvPr>
+            <p:cNvCxnSpPr>
+              <a:cxnSpLocks/>
+              <a:stCxn id="18" idx="2"/>
+              <a:endCxn id="16" idx="0"/>
+            </p:cNvCxnSpPr>
+            <p:nvPr/>
+          </p:nvCxnSpPr>
+          <p:spPr>
+            <a:xfrm flipH="1">
+              <a:off x="3810699" y="1175657"/>
+              <a:ext cx="10101" cy="1275437"/>
+            </a:xfrm>
+            <a:prstGeom prst="straightConnector1">
+              <a:avLst/>
+            </a:prstGeom>
+            <a:ln w="28575">
+              <a:solidFill>
+                <a:srgbClr val="FF66FF"/>
+              </a:solidFill>
+              <a:tailEnd type="triangle"/>
+            </a:ln>
+          </p:spPr>
+          <p:style>
+            <a:lnRef idx="1">
+              <a:schemeClr val="accent1"/>
+            </a:lnRef>
+            <a:fillRef idx="0">
+              <a:schemeClr val="accent1"/>
+            </a:fillRef>
+            <a:effectRef idx="0">
+              <a:schemeClr val="accent1"/>
+            </a:effectRef>
+            <a:fontRef idx="minor">
+              <a:schemeClr val="tx1"/>
+            </a:fontRef>
+          </p:style>
+        </p:cxnSp>
+        <p:cxnSp>
+          <p:nvCxnSpPr>
+            <p:cNvPr id="22" name="Straight Arrow Connector 21">
+              <a:extLst>
+                <a:ext uri="{FF2B5EF4-FFF2-40B4-BE49-F238E27FC236}">
+                  <a16:creationId xmlns:a16="http://schemas.microsoft.com/office/drawing/2014/main" id="{13030DD6-F103-4091-B3C0-391EC46478D4}"/>
+                </a:ext>
+              </a:extLst>
+            </p:cNvPr>
+            <p:cNvCxnSpPr>
+              <a:cxnSpLocks/>
+            </p:cNvCxnSpPr>
+            <p:nvPr/>
+          </p:nvCxnSpPr>
+          <p:spPr>
+            <a:xfrm>
+              <a:off x="11171296" y="2946400"/>
+              <a:ext cx="0" cy="965201"/>
+            </a:xfrm>
+            <a:prstGeom prst="straightConnector1">
+              <a:avLst/>
+            </a:prstGeom>
+            <a:ln w="38100">
+              <a:solidFill>
+                <a:schemeClr val="accent4">
+                  <a:lumMod val="75000"/>
+                </a:schemeClr>
+              </a:solidFill>
+              <a:tailEnd type="triangle"/>
+            </a:ln>
+          </p:spPr>
+          <p:style>
+            <a:lnRef idx="1">
+              <a:schemeClr val="accent1"/>
+            </a:lnRef>
+            <a:fillRef idx="0">
+              <a:schemeClr val="accent1"/>
+            </a:fillRef>
+            <a:effectRef idx="0">
+              <a:schemeClr val="accent1"/>
+            </a:effectRef>
+            <a:fontRef idx="minor">
+              <a:schemeClr val="tx1"/>
+            </a:fontRef>
+          </p:style>
+        </p:cxnSp>
+        <p:cxnSp>
+          <p:nvCxnSpPr>
+            <p:cNvPr id="30" name="Straight Arrow Connector 29">
+              <a:extLst>
+                <a:ext uri="{FF2B5EF4-FFF2-40B4-BE49-F238E27FC236}">
+                  <a16:creationId xmlns:a16="http://schemas.microsoft.com/office/drawing/2014/main" id="{90067718-78A6-4CBD-B92A-C17A78E6878E}"/>
+                </a:ext>
+              </a:extLst>
+            </p:cNvPr>
+            <p:cNvCxnSpPr>
+              <a:cxnSpLocks/>
+              <a:stCxn id="13" idx="2"/>
+            </p:cNvCxnSpPr>
+            <p:nvPr/>
+          </p:nvCxnSpPr>
+          <p:spPr>
+            <a:xfrm flipH="1">
+              <a:off x="9278583" y="2946400"/>
+              <a:ext cx="1892713" cy="965201"/>
+            </a:xfrm>
+            <a:prstGeom prst="straightConnector1">
+              <a:avLst/>
+            </a:prstGeom>
+            <a:ln w="38100">
+              <a:solidFill>
+                <a:schemeClr val="accent4">
+                  <a:lumMod val="75000"/>
+                </a:schemeClr>
+              </a:solidFill>
+              <a:tailEnd type="triangle"/>
+            </a:ln>
+          </p:spPr>
+          <p:style>
+            <a:lnRef idx="1">
+              <a:schemeClr val="accent1"/>
+            </a:lnRef>
+            <a:fillRef idx="0">
+              <a:schemeClr val="accent1"/>
+            </a:fillRef>
+            <a:effectRef idx="0">
+              <a:schemeClr val="accent1"/>
+            </a:effectRef>
+            <a:fontRef idx="minor">
+              <a:schemeClr val="tx1"/>
+            </a:fontRef>
+          </p:style>
+        </p:cxnSp>
+        <p:cxnSp>
+          <p:nvCxnSpPr>
+            <p:cNvPr id="35" name="Straight Arrow Connector 34">
+              <a:extLst>
+                <a:ext uri="{FF2B5EF4-FFF2-40B4-BE49-F238E27FC236}">
+                  <a16:creationId xmlns:a16="http://schemas.microsoft.com/office/drawing/2014/main" id="{7BC9051F-9781-49B3-B19A-355AA14AB1F7}"/>
+                </a:ext>
+              </a:extLst>
+            </p:cNvPr>
+            <p:cNvCxnSpPr>
+              <a:cxnSpLocks/>
+            </p:cNvCxnSpPr>
+            <p:nvPr/>
+          </p:nvCxnSpPr>
+          <p:spPr>
+            <a:xfrm flipH="1">
+              <a:off x="10224939" y="2954750"/>
+              <a:ext cx="946357" cy="956851"/>
+            </a:xfrm>
+            <a:prstGeom prst="straightConnector1">
+              <a:avLst/>
+            </a:prstGeom>
+            <a:ln w="38100">
+              <a:solidFill>
+                <a:schemeClr val="accent4">
+                  <a:lumMod val="75000"/>
+                </a:schemeClr>
+              </a:solidFill>
+              <a:tailEnd type="triangle"/>
+            </a:ln>
+          </p:spPr>
+          <p:style>
+            <a:lnRef idx="1">
+              <a:schemeClr val="accent1"/>
+            </a:lnRef>
+            <a:fillRef idx="0">
+              <a:schemeClr val="accent1"/>
+            </a:fillRef>
+            <a:effectRef idx="0">
+              <a:schemeClr val="accent1"/>
+            </a:effectRef>
+            <a:fontRef idx="minor">
+              <a:schemeClr val="tx1"/>
+            </a:fontRef>
+          </p:style>
+        </p:cxnSp>
+        <p:sp>
+          <p:nvSpPr>
+            <p:cNvPr id="8" name="TextBox 7">
+              <a:extLst>
+                <a:ext uri="{FF2B5EF4-FFF2-40B4-BE49-F238E27FC236}">
+                  <a16:creationId xmlns:a16="http://schemas.microsoft.com/office/drawing/2014/main" id="{A9B1E70A-427D-44EF-9CD9-1A6665FD1AC8}"/>
+                </a:ext>
+              </a:extLst>
+            </p:cNvPr>
+            <p:cNvSpPr txBox="1"/>
+            <p:nvPr/>
+          </p:nvSpPr>
+          <p:spPr>
+            <a:xfrm>
+              <a:off x="8700492" y="3291927"/>
+              <a:ext cx="1156179" cy="369332"/>
+            </a:xfrm>
+            <a:prstGeom prst="rect">
+              <a:avLst/>
+            </a:prstGeom>
+            <a:noFill/>
+          </p:spPr>
+          <p:txBody>
+            <a:bodyPr wrap="square" rtlCol="0">
+              <a:spAutoFit/>
+            </a:bodyPr>
+            <a:lstStyle/>
+            <a:p>
+              <a:pPr algn="ctr"/>
+              <a:r>
+                <a:rPr lang="en-SG" dirty="0"/>
+                <a:t>divided by</a:t>
+              </a:r>
+            </a:p>
+          </p:txBody>
+        </p:sp>
+        <p:cxnSp>
+          <p:nvCxnSpPr>
+            <p:cNvPr id="40" name="Connector: Elbow 39">
+              <a:extLst>
+                <a:ext uri="{FF2B5EF4-FFF2-40B4-BE49-F238E27FC236}">
+                  <a16:creationId xmlns:a16="http://schemas.microsoft.com/office/drawing/2014/main" id="{39F53C44-AA76-489A-BB17-A2056E652BFD}"/>
+                </a:ext>
+              </a:extLst>
+            </p:cNvPr>
+            <p:cNvCxnSpPr>
+              <a:cxnSpLocks/>
+            </p:cNvCxnSpPr>
+            <p:nvPr/>
+          </p:nvCxnSpPr>
+          <p:spPr>
+            <a:xfrm rot="10800000" flipH="1" flipV="1">
+              <a:off x="10756816" y="655710"/>
+              <a:ext cx="414480" cy="915685"/>
+            </a:xfrm>
+            <a:prstGeom prst="bentConnector4">
+              <a:avLst>
+                <a:gd name="adj1" fmla="val 100349"/>
+                <a:gd name="adj2" fmla="val 100910"/>
+              </a:avLst>
+            </a:prstGeom>
+            <a:ln w="19050">
+              <a:solidFill>
+                <a:schemeClr val="accent4">
+                  <a:lumMod val="75000"/>
+                </a:schemeClr>
+              </a:solidFill>
+              <a:tailEnd type="triangle"/>
+            </a:ln>
+          </p:spPr>
+          <p:style>
+            <a:lnRef idx="1">
+              <a:schemeClr val="accent1"/>
+            </a:lnRef>
+            <a:fillRef idx="0">
+              <a:schemeClr val="accent1"/>
+            </a:fillRef>
+            <a:effectRef idx="0">
+              <a:schemeClr val="accent1"/>
+            </a:effectRef>
+            <a:fontRef idx="minor">
+              <a:schemeClr val="tx1"/>
+            </a:fontRef>
+          </p:style>
+        </p:cxnSp>
+        <p:sp>
+          <p:nvSpPr>
+            <p:cNvPr id="43" name="Right Brace 42">
+              <a:extLst>
+                <a:ext uri="{FF2B5EF4-FFF2-40B4-BE49-F238E27FC236}">
+                  <a16:creationId xmlns:a16="http://schemas.microsoft.com/office/drawing/2014/main" id="{1BA38BDF-B1E9-4DB0-86AA-2132B21AEC86}"/>
+                </a:ext>
+              </a:extLst>
+            </p:cNvPr>
+            <p:cNvSpPr/>
+            <p:nvPr/>
+          </p:nvSpPr>
+          <p:spPr>
+            <a:xfrm>
+              <a:off x="10587193" y="448850"/>
+              <a:ext cx="169623" cy="413721"/>
+            </a:xfrm>
+            <a:prstGeom prst="rightBrace">
+              <a:avLst>
+                <a:gd name="adj1" fmla="val 0"/>
+                <a:gd name="adj2" fmla="val 50000"/>
+              </a:avLst>
+            </a:prstGeom>
+            <a:ln w="19050">
+              <a:solidFill>
+                <a:schemeClr val="accent4">
+                  <a:lumMod val="75000"/>
+                </a:schemeClr>
+              </a:solidFill>
+            </a:ln>
+          </p:spPr>
+          <p:style>
+            <a:lnRef idx="1">
+              <a:schemeClr val="accent1"/>
+            </a:lnRef>
+            <a:fillRef idx="0">
+              <a:schemeClr val="accent1"/>
+            </a:fillRef>
+            <a:effectRef idx="0">
+              <a:schemeClr val="accent1"/>
+            </a:effectRef>
+            <a:fontRef idx="minor">
+              <a:schemeClr val="tx1"/>
+            </a:fontRef>
+          </p:style>
+          <p:txBody>
+            <a:bodyPr rtlCol="0" anchor="ctr"/>
+            <a:lstStyle/>
+            <a:p>
+              <a:pPr algn="ctr"/>
+              <a:endParaRPr lang="en-SG"/>
+            </a:p>
+          </p:txBody>
+        </p:sp>
+      </p:grpSp>
+    </p:spTree>
+    <p:extLst>
+      <p:ext uri="{BB962C8B-B14F-4D97-AF65-F5344CB8AC3E}">
+        <p14:creationId xmlns:p14="http://schemas.microsoft.com/office/powerpoint/2010/main" val="1023774816"/>
+      </p:ext>
+    </p:extLst>
+  </p:cSld>
+  <p:clrMapOvr>
+    <a:masterClrMapping/>
+  </p:clrMapOvr>
+</p:sld>
+</file>
+
+<file path=ppt/slides/slide11.xml><?xml version="1.0" encoding="utf-8"?>
+<p:sld xmlns:a="http://schemas.openxmlformats.org/drawingml/2006/main" xmlns:r="http://schemas.openxmlformats.org/officeDocument/2006/relationships" xmlns:p="http://schemas.openxmlformats.org/presentationml/2006/main">
+  <p:cSld>
+    <p:spTree>
+      <p:nvGrpSpPr>
+        <p:cNvPr id="1" name=""/>
+        <p:cNvGrpSpPr/>
+        <p:nvPr/>
+      </p:nvGrpSpPr>
+      <p:grpSpPr>
+        <a:xfrm>
+          <a:off x="0" y="0"/>
+          <a:ext cx="0" cy="0"/>
+          <a:chOff x="0" y="0"/>
+          <a:chExt cx="0" cy="0"/>
+        </a:xfrm>
+      </p:grpSpPr>
+      <p:sp>
+        <p:nvSpPr>
+          <p:cNvPr id="6" name="TextBox 5">
+            <a:extLst>
+              <a:ext uri="{FF2B5EF4-FFF2-40B4-BE49-F238E27FC236}">
+                <a16:creationId xmlns:a16="http://schemas.microsoft.com/office/drawing/2014/main" id="{A94533D7-0ACE-451E-8D9A-67D53D4E184D}"/>
+              </a:ext>
+            </a:extLst>
+          </p:cNvPr>
+          <p:cNvSpPr txBox="1"/>
+          <p:nvPr/>
+        </p:nvSpPr>
+        <p:spPr>
+          <a:xfrm>
+            <a:off x="1013971" y="1155302"/>
+            <a:ext cx="2621744" cy="369332"/>
+          </a:xfrm>
+          <a:prstGeom prst="rect">
+            <a:avLst/>
+          </a:prstGeom>
+          <a:noFill/>
+        </p:spPr>
+        <p:txBody>
+          <a:bodyPr wrap="square" rtlCol="0">
+            <a:spAutoFit/>
+          </a:bodyPr>
+          <a:lstStyle/>
+          <a:p>
+            <a:r>
+              <a:rPr lang="en-SG" dirty="0"/>
+              <a:t>Tutorial: </a:t>
+            </a:r>
+            <a:r>
+              <a:rPr lang="en-SG" dirty="0" err="1"/>
+              <a:t>Github</a:t>
+            </a:r>
+            <a:r>
+              <a:rPr lang="en-SG" dirty="0"/>
+              <a:t> README</a:t>
+            </a:r>
+          </a:p>
+        </p:txBody>
+      </p:sp>
+      <p:sp>
+        <p:nvSpPr>
+          <p:cNvPr id="7" name="TextBox 6">
+            <a:extLst>
+              <a:ext uri="{FF2B5EF4-FFF2-40B4-BE49-F238E27FC236}">
+                <a16:creationId xmlns:a16="http://schemas.microsoft.com/office/drawing/2014/main" id="{17B81847-2442-445B-8F92-18BFB1D2FFB8}"/>
+              </a:ext>
+            </a:extLst>
+          </p:cNvPr>
+          <p:cNvSpPr txBox="1"/>
+          <p:nvPr/>
+        </p:nvSpPr>
+        <p:spPr>
+          <a:xfrm>
+            <a:off x="5784718" y="1155302"/>
+            <a:ext cx="2621744" cy="369332"/>
+          </a:xfrm>
+          <a:prstGeom prst="rect">
+            <a:avLst/>
+          </a:prstGeom>
+          <a:noFill/>
+        </p:spPr>
+        <p:txBody>
+          <a:bodyPr wrap="square" rtlCol="0">
+            <a:spAutoFit/>
+          </a:bodyPr>
+          <a:lstStyle/>
+          <a:p>
+            <a:r>
+              <a:rPr lang="en-SG" dirty="0"/>
+              <a:t>How to guide: </a:t>
+            </a:r>
+            <a:r>
+              <a:rPr lang="en-SG" dirty="0" err="1"/>
+              <a:t>Cheatsheet</a:t>
+            </a:r>
+            <a:endParaRPr lang="en-SG" dirty="0"/>
+          </a:p>
+        </p:txBody>
+      </p:sp>
+      <p:pic>
+        <p:nvPicPr>
+          <p:cNvPr id="2" name="Picture 1">
+            <a:extLst>
+              <a:ext uri="{FF2B5EF4-FFF2-40B4-BE49-F238E27FC236}">
+                <a16:creationId xmlns:a16="http://schemas.microsoft.com/office/drawing/2014/main" id="{7CF9116E-898D-4FCE-936A-C57069E8F1D8}"/>
+              </a:ext>
+            </a:extLst>
+          </p:cNvPr>
+          <p:cNvPicPr>
+            <a:picLocks noChangeAspect="1"/>
+          </p:cNvPicPr>
+          <p:nvPr/>
+        </p:nvPicPr>
+        <p:blipFill>
+          <a:blip r:embed="rId2"/>
+          <a:stretch>
+            <a:fillRect/>
+          </a:stretch>
+        </p:blipFill>
+        <p:spPr>
+          <a:xfrm>
+            <a:off x="218171" y="1524634"/>
+            <a:ext cx="6835087" cy="4774566"/>
+          </a:xfrm>
+          <a:prstGeom prst="rect">
+            <a:avLst/>
+          </a:prstGeom>
+        </p:spPr>
+      </p:pic>
+      <p:pic>
+        <p:nvPicPr>
+          <p:cNvPr id="3" name="Picture 2">
+            <a:extLst>
+              <a:ext uri="{FF2B5EF4-FFF2-40B4-BE49-F238E27FC236}">
+                <a16:creationId xmlns:a16="http://schemas.microsoft.com/office/drawing/2014/main" id="{B3DD51C1-A30E-40E4-BCAD-88F940928DFF}"/>
+              </a:ext>
+            </a:extLst>
+          </p:cNvPr>
+          <p:cNvPicPr>
+            <a:picLocks noChangeAspect="1"/>
+          </p:cNvPicPr>
+          <p:nvPr/>
+        </p:nvPicPr>
+        <p:blipFill>
+          <a:blip r:embed="rId3"/>
+          <a:stretch>
+            <a:fillRect/>
+          </a:stretch>
+        </p:blipFill>
+        <p:spPr>
+          <a:xfrm>
+            <a:off x="4194594" y="1893966"/>
+            <a:ext cx="7348873" cy="4159489"/>
+          </a:xfrm>
+          <a:prstGeom prst="rect">
+            <a:avLst/>
+          </a:prstGeom>
+        </p:spPr>
+      </p:pic>
+    </p:spTree>
+    <p:extLst>
+      <p:ext uri="{BB962C8B-B14F-4D97-AF65-F5344CB8AC3E}">
+        <p14:creationId xmlns:p14="http://schemas.microsoft.com/office/powerpoint/2010/main" val="81797160"/>
+      </p:ext>
+    </p:extLst>
+  </p:cSld>
+  <p:clrMapOvr>
+    <a:masterClrMapping/>
+  </p:clrMapOvr>
+</p:sld>
+</file>
+
+<file path=ppt/slides/slide12.xml><?xml version="1.0" encoding="utf-8"?>
+<p:sld xmlns:a="http://schemas.openxmlformats.org/drawingml/2006/main" xmlns:r="http://schemas.openxmlformats.org/officeDocument/2006/relationships" xmlns:p="http://schemas.openxmlformats.org/presentationml/2006/main">
+  <p:cSld>
+    <p:spTree>
+      <p:nvGrpSpPr>
+        <p:cNvPr id="1" name=""/>
+        <p:cNvGrpSpPr/>
+        <p:nvPr/>
+      </p:nvGrpSpPr>
+      <p:grpSpPr>
+        <a:xfrm>
+          <a:off x="0" y="0"/>
+          <a:ext cx="0" cy="0"/>
+          <a:chOff x="0" y="0"/>
+          <a:chExt cx="0" cy="0"/>
+        </a:xfrm>
+      </p:grpSpPr>
       <p:sp>
         <p:nvSpPr>
           <p:cNvPr id="4" name="TextBox 3">
@@ -4158,6 +5101,870 @@
       </p:grpSpPr>
       <p:grpSp>
         <p:nvGrpSpPr>
+          <p:cNvPr id="2" name="Group 1">
+            <a:extLst>
+              <a:ext uri="{FF2B5EF4-FFF2-40B4-BE49-F238E27FC236}">
+                <a16:creationId xmlns:a16="http://schemas.microsoft.com/office/drawing/2014/main" id="{9CD49D51-110C-4E2C-9D64-FB884B7E25FC}"/>
+              </a:ext>
+            </a:extLst>
+          </p:cNvPr>
+          <p:cNvGrpSpPr/>
+          <p:nvPr/>
+        </p:nvGrpSpPr>
+        <p:grpSpPr>
+          <a:xfrm>
+            <a:off x="153925" y="481958"/>
+            <a:ext cx="11318428" cy="5894084"/>
+            <a:chOff x="153925" y="481958"/>
+            <a:chExt cx="11318428" cy="5894084"/>
+          </a:xfrm>
+        </p:grpSpPr>
+        <p:pic>
+          <p:nvPicPr>
+            <p:cNvPr id="5" name="Picture 4">
+              <a:extLst>
+                <a:ext uri="{FF2B5EF4-FFF2-40B4-BE49-F238E27FC236}">
+                  <a16:creationId xmlns:a16="http://schemas.microsoft.com/office/drawing/2014/main" id="{989A5CDD-BC5A-42D5-87B9-985A0A0CBF66}"/>
+                </a:ext>
+              </a:extLst>
+            </p:cNvPr>
+            <p:cNvPicPr>
+              <a:picLocks noChangeAspect="1"/>
+            </p:cNvPicPr>
+            <p:nvPr/>
+          </p:nvPicPr>
+          <p:blipFill>
+            <a:blip r:embed="rId2"/>
+            <a:stretch>
+              <a:fillRect/>
+            </a:stretch>
+          </p:blipFill>
+          <p:spPr>
+            <a:xfrm>
+              <a:off x="1580679" y="3420424"/>
+              <a:ext cx="5022174" cy="2078144"/>
+            </a:xfrm>
+            <a:prstGeom prst="rect">
+              <a:avLst/>
+            </a:prstGeom>
+            <a:ln w="28575">
+              <a:solidFill>
+                <a:schemeClr val="tx1"/>
+              </a:solidFill>
+            </a:ln>
+          </p:spPr>
+        </p:pic>
+        <p:sp>
+          <p:nvSpPr>
+            <p:cNvPr id="9" name="Rectangle 8">
+              <a:extLst>
+                <a:ext uri="{FF2B5EF4-FFF2-40B4-BE49-F238E27FC236}">
+                  <a16:creationId xmlns:a16="http://schemas.microsoft.com/office/drawing/2014/main" id="{72A82116-6B4C-4C90-B8F2-D1AF74801A1F}"/>
+                </a:ext>
+              </a:extLst>
+            </p:cNvPr>
+            <p:cNvSpPr/>
+            <p:nvPr/>
+          </p:nvSpPr>
+          <p:spPr>
+            <a:xfrm>
+              <a:off x="3812567" y="3720137"/>
+              <a:ext cx="472516" cy="1778431"/>
+            </a:xfrm>
+            <a:prstGeom prst="rect">
+              <a:avLst/>
+            </a:prstGeom>
+            <a:noFill/>
+            <a:ln w="28575">
+              <a:solidFill>
+                <a:srgbClr val="FFC000"/>
+              </a:solidFill>
+            </a:ln>
+          </p:spPr>
+          <p:style>
+            <a:lnRef idx="2">
+              <a:schemeClr val="accent1">
+                <a:shade val="50000"/>
+              </a:schemeClr>
+            </a:lnRef>
+            <a:fillRef idx="1">
+              <a:schemeClr val="accent1"/>
+            </a:fillRef>
+            <a:effectRef idx="0">
+              <a:schemeClr val="accent1"/>
+            </a:effectRef>
+            <a:fontRef idx="minor">
+              <a:schemeClr val="lt1"/>
+            </a:fontRef>
+          </p:style>
+          <p:txBody>
+            <a:bodyPr rtlCol="0" anchor="ctr"/>
+            <a:lstStyle/>
+            <a:p>
+              <a:pPr algn="ctr"/>
+              <a:endParaRPr lang="en-SG"/>
+            </a:p>
+          </p:txBody>
+        </p:sp>
+        <p:pic>
+          <p:nvPicPr>
+            <p:cNvPr id="6" name="Picture 5">
+              <a:extLst>
+                <a:ext uri="{FF2B5EF4-FFF2-40B4-BE49-F238E27FC236}">
+                  <a16:creationId xmlns:a16="http://schemas.microsoft.com/office/drawing/2014/main" id="{D085579B-5312-496D-84A6-289AD0CA44D3}"/>
+                </a:ext>
+              </a:extLst>
+            </p:cNvPr>
+            <p:cNvPicPr>
+              <a:picLocks noChangeAspect="1"/>
+            </p:cNvPicPr>
+            <p:nvPr/>
+          </p:nvPicPr>
+          <p:blipFill>
+            <a:blip r:embed="rId3"/>
+            <a:stretch>
+              <a:fillRect/>
+            </a:stretch>
+          </p:blipFill>
+          <p:spPr>
+            <a:xfrm>
+              <a:off x="7294929" y="3420424"/>
+              <a:ext cx="3774626" cy="2078144"/>
+            </a:xfrm>
+            <a:prstGeom prst="rect">
+              <a:avLst/>
+            </a:prstGeom>
+          </p:spPr>
+        </p:pic>
+        <p:sp>
+          <p:nvSpPr>
+            <p:cNvPr id="10" name="Rectangle 9">
+              <a:extLst>
+                <a:ext uri="{FF2B5EF4-FFF2-40B4-BE49-F238E27FC236}">
+                  <a16:creationId xmlns:a16="http://schemas.microsoft.com/office/drawing/2014/main" id="{46E844C9-17A3-4388-93B4-157C6AF6E0EA}"/>
+                </a:ext>
+              </a:extLst>
+            </p:cNvPr>
+            <p:cNvSpPr/>
+            <p:nvPr/>
+          </p:nvSpPr>
+          <p:spPr>
+            <a:xfrm>
+              <a:off x="8897745" y="3577558"/>
+              <a:ext cx="523999" cy="1687855"/>
+            </a:xfrm>
+            <a:prstGeom prst="rect">
+              <a:avLst/>
+            </a:prstGeom>
+            <a:noFill/>
+            <a:ln w="28575">
+              <a:solidFill>
+                <a:srgbClr val="FFC000"/>
+              </a:solidFill>
+            </a:ln>
+          </p:spPr>
+          <p:style>
+            <a:lnRef idx="2">
+              <a:schemeClr val="accent1">
+                <a:shade val="50000"/>
+              </a:schemeClr>
+            </a:lnRef>
+            <a:fillRef idx="1">
+              <a:schemeClr val="accent1"/>
+            </a:fillRef>
+            <a:effectRef idx="0">
+              <a:schemeClr val="accent1"/>
+            </a:effectRef>
+            <a:fontRef idx="minor">
+              <a:schemeClr val="lt1"/>
+            </a:fontRef>
+          </p:style>
+          <p:txBody>
+            <a:bodyPr rtlCol="0" anchor="ctr"/>
+            <a:lstStyle/>
+            <a:p>
+              <a:pPr algn="ctr"/>
+              <a:endParaRPr lang="en-SG"/>
+            </a:p>
+          </p:txBody>
+        </p:sp>
+        <p:pic>
+          <p:nvPicPr>
+            <p:cNvPr id="15" name="Picture 14">
+              <a:extLst>
+                <a:ext uri="{FF2B5EF4-FFF2-40B4-BE49-F238E27FC236}">
+                  <a16:creationId xmlns:a16="http://schemas.microsoft.com/office/drawing/2014/main" id="{AB924F42-FE07-4CA4-B4EA-6BE204CF9B59}"/>
+                </a:ext>
+              </a:extLst>
+            </p:cNvPr>
+            <p:cNvPicPr>
+              <a:picLocks noChangeAspect="1"/>
+            </p:cNvPicPr>
+            <p:nvPr/>
+          </p:nvPicPr>
+          <p:blipFill>
+            <a:blip r:embed="rId4"/>
+            <a:stretch>
+              <a:fillRect/>
+            </a:stretch>
+          </p:blipFill>
+          <p:spPr>
+            <a:xfrm>
+              <a:off x="1580679" y="481958"/>
+              <a:ext cx="9891674" cy="2550135"/>
+            </a:xfrm>
+            <a:prstGeom prst="rect">
+              <a:avLst/>
+            </a:prstGeom>
+          </p:spPr>
+        </p:pic>
+        <p:cxnSp>
+          <p:nvCxnSpPr>
+            <p:cNvPr id="17" name="Connector: Elbow 16">
+              <a:extLst>
+                <a:ext uri="{FF2B5EF4-FFF2-40B4-BE49-F238E27FC236}">
+                  <a16:creationId xmlns:a16="http://schemas.microsoft.com/office/drawing/2014/main" id="{63FE5A1F-15DF-4E96-8D80-9DAB6B984021}"/>
+                </a:ext>
+              </a:extLst>
+            </p:cNvPr>
+            <p:cNvCxnSpPr>
+              <a:stCxn id="9" idx="2"/>
+              <a:endCxn id="6" idx="2"/>
+            </p:cNvCxnSpPr>
+            <p:nvPr/>
+          </p:nvCxnSpPr>
+          <p:spPr>
+            <a:xfrm rot="16200000" flipH="1">
+              <a:off x="6615533" y="2931859"/>
+              <a:ext cx="12700" cy="5133417"/>
+            </a:xfrm>
+            <a:prstGeom prst="bentConnector3">
+              <a:avLst>
+                <a:gd name="adj1" fmla="val 3600000"/>
+              </a:avLst>
+            </a:prstGeom>
+            <a:ln w="38100">
+              <a:tailEnd type="triangle"/>
+            </a:ln>
+          </p:spPr>
+          <p:style>
+            <a:lnRef idx="1">
+              <a:schemeClr val="accent1"/>
+            </a:lnRef>
+            <a:fillRef idx="0">
+              <a:schemeClr val="accent1"/>
+            </a:fillRef>
+            <a:effectRef idx="0">
+              <a:schemeClr val="accent1"/>
+            </a:effectRef>
+            <a:fontRef idx="minor">
+              <a:schemeClr val="tx1"/>
+            </a:fontRef>
+          </p:style>
+        </p:cxnSp>
+        <p:cxnSp>
+          <p:nvCxnSpPr>
+            <p:cNvPr id="19" name="Connector: Elbow 18">
+              <a:extLst>
+                <a:ext uri="{FF2B5EF4-FFF2-40B4-BE49-F238E27FC236}">
+                  <a16:creationId xmlns:a16="http://schemas.microsoft.com/office/drawing/2014/main" id="{D41419EB-7751-4150-9D85-594F848BA2D1}"/>
+                </a:ext>
+              </a:extLst>
+            </p:cNvPr>
+            <p:cNvCxnSpPr>
+              <a:cxnSpLocks/>
+              <a:stCxn id="15" idx="1"/>
+              <a:endCxn id="5" idx="1"/>
+            </p:cNvCxnSpPr>
+            <p:nvPr/>
+          </p:nvCxnSpPr>
+          <p:spPr>
+            <a:xfrm rot="10800000" flipV="1">
+              <a:off x="1580679" y="1757026"/>
+              <a:ext cx="12700" cy="2702470"/>
+            </a:xfrm>
+            <a:prstGeom prst="bentConnector3">
+              <a:avLst>
+                <a:gd name="adj1" fmla="val 4168417"/>
+              </a:avLst>
+            </a:prstGeom>
+            <a:ln w="38100">
+              <a:tailEnd type="triangle"/>
+            </a:ln>
+          </p:spPr>
+          <p:style>
+            <a:lnRef idx="1">
+              <a:schemeClr val="accent1"/>
+            </a:lnRef>
+            <a:fillRef idx="0">
+              <a:schemeClr val="accent1"/>
+            </a:fillRef>
+            <a:effectRef idx="0">
+              <a:schemeClr val="accent1"/>
+            </a:effectRef>
+            <a:fontRef idx="minor">
+              <a:schemeClr val="tx1"/>
+            </a:fontRef>
+          </p:style>
+        </p:cxnSp>
+        <p:sp>
+          <p:nvSpPr>
+            <p:cNvPr id="23" name="TextBox 22">
+              <a:extLst>
+                <a:ext uri="{FF2B5EF4-FFF2-40B4-BE49-F238E27FC236}">
+                  <a16:creationId xmlns:a16="http://schemas.microsoft.com/office/drawing/2014/main" id="{49E41682-E124-48F3-B477-AE2DDC493083}"/>
+                </a:ext>
+              </a:extLst>
+            </p:cNvPr>
+            <p:cNvSpPr txBox="1"/>
+            <p:nvPr/>
+          </p:nvSpPr>
+          <p:spPr>
+            <a:xfrm>
+              <a:off x="153925" y="2695211"/>
+              <a:ext cx="1016660" cy="646331"/>
+            </a:xfrm>
+            <a:prstGeom prst="rect">
+              <a:avLst/>
+            </a:prstGeom>
+            <a:noFill/>
+          </p:spPr>
+          <p:txBody>
+            <a:bodyPr wrap="square" rtlCol="0">
+              <a:spAutoFit/>
+            </a:bodyPr>
+            <a:lstStyle/>
+            <a:p>
+              <a:pPr algn="ctr"/>
+              <a:r>
+                <a:rPr lang="en-SG" dirty="0"/>
+                <a:t>Export as csv</a:t>
+              </a:r>
+            </a:p>
+          </p:txBody>
+        </p:sp>
+        <p:sp>
+          <p:nvSpPr>
+            <p:cNvPr id="24" name="TextBox 23">
+              <a:extLst>
+                <a:ext uri="{FF2B5EF4-FFF2-40B4-BE49-F238E27FC236}">
+                  <a16:creationId xmlns:a16="http://schemas.microsoft.com/office/drawing/2014/main" id="{B60F2390-2059-4F9A-AE46-0E1024BDB72B}"/>
+                </a:ext>
+              </a:extLst>
+            </p:cNvPr>
+            <p:cNvSpPr txBox="1"/>
+            <p:nvPr/>
+          </p:nvSpPr>
+          <p:spPr>
+            <a:xfrm>
+              <a:off x="5495941" y="6006710"/>
+              <a:ext cx="2275948" cy="369332"/>
+            </a:xfrm>
+            <a:prstGeom prst="rect">
+              <a:avLst/>
+            </a:prstGeom>
+            <a:noFill/>
+          </p:spPr>
+          <p:txBody>
+            <a:bodyPr wrap="square" rtlCol="0">
+              <a:spAutoFit/>
+            </a:bodyPr>
+            <a:lstStyle/>
+            <a:p>
+              <a:pPr algn="ctr"/>
+              <a:r>
+                <a:rPr lang="en-SG" b="1" dirty="0" err="1"/>
+                <a:t>MSOrganiser</a:t>
+              </a:r>
+              <a:endParaRPr lang="en-SG" b="1" dirty="0"/>
+            </a:p>
+          </p:txBody>
+        </p:sp>
+      </p:grpSp>
+    </p:spTree>
+    <p:extLst>
+      <p:ext uri="{BB962C8B-B14F-4D97-AF65-F5344CB8AC3E}">
+        <p14:creationId xmlns:p14="http://schemas.microsoft.com/office/powerpoint/2010/main" val="3817888693"/>
+      </p:ext>
+    </p:extLst>
+  </p:cSld>
+  <p:clrMapOvr>
+    <a:masterClrMapping/>
+  </p:clrMapOvr>
+</p:sld>
+</file>
+
+<file path=ppt/slides/slide5.xml><?xml version="1.0" encoding="utf-8"?>
+<p:sld xmlns:a="http://schemas.openxmlformats.org/drawingml/2006/main" xmlns:r="http://schemas.openxmlformats.org/officeDocument/2006/relationships" xmlns:p="http://schemas.openxmlformats.org/presentationml/2006/main">
+  <p:cSld>
+    <p:spTree>
+      <p:nvGrpSpPr>
+        <p:cNvPr id="1" name=""/>
+        <p:cNvGrpSpPr/>
+        <p:nvPr/>
+      </p:nvGrpSpPr>
+      <p:grpSpPr>
+        <a:xfrm>
+          <a:off x="0" y="0"/>
+          <a:ext cx="0" cy="0"/>
+          <a:chOff x="0" y="0"/>
+          <a:chExt cx="0" cy="0"/>
+        </a:xfrm>
+      </p:grpSpPr>
+      <p:grpSp>
+        <p:nvGrpSpPr>
+          <p:cNvPr id="65" name="Group 64">
+            <a:extLst>
+              <a:ext uri="{FF2B5EF4-FFF2-40B4-BE49-F238E27FC236}">
+                <a16:creationId xmlns:a16="http://schemas.microsoft.com/office/drawing/2014/main" id="{CCACFE23-0E3F-4794-8B05-D09760CCCFF6}"/>
+              </a:ext>
+            </a:extLst>
+          </p:cNvPr>
+          <p:cNvGrpSpPr/>
+          <p:nvPr/>
+        </p:nvGrpSpPr>
+        <p:grpSpPr>
+          <a:xfrm>
+            <a:off x="324522" y="400049"/>
+            <a:ext cx="11729191" cy="6159370"/>
+            <a:chOff x="324522" y="400049"/>
+            <a:chExt cx="11729191" cy="6159370"/>
+          </a:xfrm>
+        </p:grpSpPr>
+        <p:pic>
+          <p:nvPicPr>
+            <p:cNvPr id="5" name="Picture 4">
+              <a:extLst>
+                <a:ext uri="{FF2B5EF4-FFF2-40B4-BE49-F238E27FC236}">
+                  <a16:creationId xmlns:a16="http://schemas.microsoft.com/office/drawing/2014/main" id="{53199671-73C3-41EB-BE3F-45B7AB2F264F}"/>
+                </a:ext>
+              </a:extLst>
+            </p:cNvPr>
+            <p:cNvPicPr>
+              <a:picLocks noChangeAspect="1"/>
+            </p:cNvPicPr>
+            <p:nvPr/>
+          </p:nvPicPr>
+          <p:blipFill>
+            <a:blip r:embed="rId2"/>
+            <a:stretch>
+              <a:fillRect/>
+            </a:stretch>
+          </p:blipFill>
+          <p:spPr>
+            <a:xfrm>
+              <a:off x="911964" y="3044276"/>
+              <a:ext cx="4690021" cy="1802600"/>
+            </a:xfrm>
+            <a:prstGeom prst="rect">
+              <a:avLst/>
+            </a:prstGeom>
+            <a:ln w="28575">
+              <a:solidFill>
+                <a:schemeClr val="tx1"/>
+              </a:solidFill>
+            </a:ln>
+          </p:spPr>
+        </p:pic>
+        <p:pic>
+          <p:nvPicPr>
+            <p:cNvPr id="9" name="Picture 8">
+              <a:extLst>
+                <a:ext uri="{FF2B5EF4-FFF2-40B4-BE49-F238E27FC236}">
+                  <a16:creationId xmlns:a16="http://schemas.microsoft.com/office/drawing/2014/main" id="{BA8CB482-ED88-43FE-8371-1B261CFFF760}"/>
+                </a:ext>
+              </a:extLst>
+            </p:cNvPr>
+            <p:cNvPicPr>
+              <a:picLocks noChangeAspect="1"/>
+            </p:cNvPicPr>
+            <p:nvPr/>
+          </p:nvPicPr>
+          <p:blipFill>
+            <a:blip r:embed="rId3"/>
+            <a:stretch>
+              <a:fillRect/>
+            </a:stretch>
+          </p:blipFill>
+          <p:spPr>
+            <a:xfrm>
+              <a:off x="324522" y="499117"/>
+              <a:ext cx="5864906" cy="1512009"/>
+            </a:xfrm>
+            <a:prstGeom prst="rect">
+              <a:avLst/>
+            </a:prstGeom>
+          </p:spPr>
+        </p:pic>
+        <p:cxnSp>
+          <p:nvCxnSpPr>
+            <p:cNvPr id="10" name="Connector: Elbow 9">
+              <a:extLst>
+                <a:ext uri="{FF2B5EF4-FFF2-40B4-BE49-F238E27FC236}">
+                  <a16:creationId xmlns:a16="http://schemas.microsoft.com/office/drawing/2014/main" id="{5F3FC55E-3E66-4C3F-9AD4-ED7E0471E01E}"/>
+                </a:ext>
+              </a:extLst>
+            </p:cNvPr>
+            <p:cNvCxnSpPr>
+              <a:cxnSpLocks/>
+              <a:stCxn id="5" idx="2"/>
+              <a:endCxn id="32" idx="2"/>
+            </p:cNvCxnSpPr>
+            <p:nvPr/>
+          </p:nvCxnSpPr>
+          <p:spPr>
+            <a:xfrm rot="16200000" flipH="1">
+              <a:off x="5938273" y="2165577"/>
+              <a:ext cx="591898" cy="5954495"/>
+            </a:xfrm>
+            <a:prstGeom prst="bentConnector3">
+              <a:avLst>
+                <a:gd name="adj1" fmla="val 212775"/>
+              </a:avLst>
+            </a:prstGeom>
+            <a:ln w="38100">
+              <a:tailEnd type="triangle"/>
+            </a:ln>
+          </p:spPr>
+          <p:style>
+            <a:lnRef idx="1">
+              <a:schemeClr val="accent1"/>
+            </a:lnRef>
+            <a:fillRef idx="0">
+              <a:schemeClr val="accent1"/>
+            </a:fillRef>
+            <a:effectRef idx="0">
+              <a:schemeClr val="accent1"/>
+            </a:effectRef>
+            <a:fontRef idx="minor">
+              <a:schemeClr val="tx1"/>
+            </a:fontRef>
+          </p:style>
+        </p:cxnSp>
+        <p:sp>
+          <p:nvSpPr>
+            <p:cNvPr id="12" name="TextBox 11">
+              <a:extLst>
+                <a:ext uri="{FF2B5EF4-FFF2-40B4-BE49-F238E27FC236}">
+                  <a16:creationId xmlns:a16="http://schemas.microsoft.com/office/drawing/2014/main" id="{60329B29-D6BC-4AD3-9B3F-9D8E9183EDBA}"/>
+                </a:ext>
+              </a:extLst>
+            </p:cNvPr>
+            <p:cNvSpPr txBox="1"/>
+            <p:nvPr/>
+          </p:nvSpPr>
+          <p:spPr>
+            <a:xfrm>
+              <a:off x="1633758" y="2286880"/>
+              <a:ext cx="1721898" cy="369332"/>
+            </a:xfrm>
+            <a:prstGeom prst="rect">
+              <a:avLst/>
+            </a:prstGeom>
+            <a:noFill/>
+          </p:spPr>
+          <p:txBody>
+            <a:bodyPr wrap="square" rtlCol="0">
+              <a:spAutoFit/>
+            </a:bodyPr>
+            <a:lstStyle/>
+            <a:p>
+              <a:pPr algn="ctr"/>
+              <a:r>
+                <a:rPr lang="en-SG" dirty="0"/>
+                <a:t>Export as csv</a:t>
+              </a:r>
+            </a:p>
+          </p:txBody>
+        </p:sp>
+        <p:sp>
+          <p:nvSpPr>
+            <p:cNvPr id="13" name="TextBox 12">
+              <a:extLst>
+                <a:ext uri="{FF2B5EF4-FFF2-40B4-BE49-F238E27FC236}">
+                  <a16:creationId xmlns:a16="http://schemas.microsoft.com/office/drawing/2014/main" id="{B40C35EC-9275-46D4-BB4B-AD2A400056A5}"/>
+                </a:ext>
+              </a:extLst>
+            </p:cNvPr>
+            <p:cNvSpPr txBox="1"/>
+            <p:nvPr/>
+          </p:nvSpPr>
+          <p:spPr>
+            <a:xfrm>
+              <a:off x="5096248" y="6190087"/>
+              <a:ext cx="2275948" cy="369332"/>
+            </a:xfrm>
+            <a:prstGeom prst="rect">
+              <a:avLst/>
+            </a:prstGeom>
+            <a:noFill/>
+          </p:spPr>
+          <p:txBody>
+            <a:bodyPr wrap="square" rtlCol="0">
+              <a:spAutoFit/>
+            </a:bodyPr>
+            <a:lstStyle/>
+            <a:p>
+              <a:pPr algn="ctr"/>
+              <a:r>
+                <a:rPr lang="en-SG" b="1" dirty="0" err="1"/>
+                <a:t>MSTemplate</a:t>
+              </a:r>
+              <a:r>
+                <a:rPr lang="en-SG" b="1" dirty="0"/>
+                <a:t> Creator</a:t>
+              </a:r>
+            </a:p>
+          </p:txBody>
+        </p:sp>
+        <p:pic>
+          <p:nvPicPr>
+            <p:cNvPr id="14" name="Picture 13">
+              <a:extLst>
+                <a:ext uri="{FF2B5EF4-FFF2-40B4-BE49-F238E27FC236}">
+                  <a16:creationId xmlns:a16="http://schemas.microsoft.com/office/drawing/2014/main" id="{6BE7A7BC-00A2-4204-9391-B9D292363B32}"/>
+                </a:ext>
+              </a:extLst>
+            </p:cNvPr>
+            <p:cNvPicPr>
+              <a:picLocks noChangeAspect="1"/>
+            </p:cNvPicPr>
+            <p:nvPr/>
+          </p:nvPicPr>
+          <p:blipFill>
+            <a:blip r:embed="rId4"/>
+            <a:stretch>
+              <a:fillRect/>
+            </a:stretch>
+          </p:blipFill>
+          <p:spPr>
+            <a:xfrm>
+              <a:off x="7628724" y="499117"/>
+              <a:ext cx="3139218" cy="1008797"/>
+            </a:xfrm>
+            <a:prstGeom prst="rect">
+              <a:avLst/>
+            </a:prstGeom>
+          </p:spPr>
+        </p:pic>
+        <p:pic>
+          <p:nvPicPr>
+            <p:cNvPr id="15" name="Picture 14">
+              <a:extLst>
+                <a:ext uri="{FF2B5EF4-FFF2-40B4-BE49-F238E27FC236}">
+                  <a16:creationId xmlns:a16="http://schemas.microsoft.com/office/drawing/2014/main" id="{847EE419-21A3-4AFC-AACD-06DAE270990A}"/>
+                </a:ext>
+              </a:extLst>
+            </p:cNvPr>
+            <p:cNvPicPr>
+              <a:picLocks noChangeAspect="1"/>
+            </p:cNvPicPr>
+            <p:nvPr/>
+          </p:nvPicPr>
+          <p:blipFill>
+            <a:blip r:embed="rId5"/>
+            <a:stretch>
+              <a:fillRect/>
+            </a:stretch>
+          </p:blipFill>
+          <p:spPr>
+            <a:xfrm>
+              <a:off x="6748376" y="1668604"/>
+              <a:ext cx="4863281" cy="951739"/>
+            </a:xfrm>
+            <a:prstGeom prst="rect">
+              <a:avLst/>
+            </a:prstGeom>
+          </p:spPr>
+        </p:pic>
+        <p:pic>
+          <p:nvPicPr>
+            <p:cNvPr id="16" name="Picture 15">
+              <a:extLst>
+                <a:ext uri="{FF2B5EF4-FFF2-40B4-BE49-F238E27FC236}">
+                  <a16:creationId xmlns:a16="http://schemas.microsoft.com/office/drawing/2014/main" id="{5D8107AB-F302-4446-A780-6B697FC26075}"/>
+                </a:ext>
+              </a:extLst>
+            </p:cNvPr>
+            <p:cNvPicPr>
+              <a:picLocks noChangeAspect="1"/>
+            </p:cNvPicPr>
+            <p:nvPr/>
+          </p:nvPicPr>
+          <p:blipFill>
+            <a:blip r:embed="rId6"/>
+            <a:stretch>
+              <a:fillRect/>
+            </a:stretch>
+          </p:blipFill>
+          <p:spPr>
+            <a:xfrm>
+              <a:off x="6481996" y="2797527"/>
+              <a:ext cx="5432673" cy="1306592"/>
+            </a:xfrm>
+            <a:prstGeom prst="rect">
+              <a:avLst/>
+            </a:prstGeom>
+          </p:spPr>
+        </p:pic>
+        <p:sp>
+          <p:nvSpPr>
+            <p:cNvPr id="32" name="Rectangle 31">
+              <a:extLst>
+                <a:ext uri="{FF2B5EF4-FFF2-40B4-BE49-F238E27FC236}">
+                  <a16:creationId xmlns:a16="http://schemas.microsoft.com/office/drawing/2014/main" id="{9BCF77FF-E532-4679-8231-067A16DD6C3C}"/>
+                </a:ext>
+              </a:extLst>
+            </p:cNvPr>
+            <p:cNvSpPr/>
+            <p:nvPr/>
+          </p:nvSpPr>
+          <p:spPr>
+            <a:xfrm>
+              <a:off x="6369227" y="400049"/>
+              <a:ext cx="5684486" cy="5038725"/>
+            </a:xfrm>
+            <a:prstGeom prst="rect">
+              <a:avLst/>
+            </a:prstGeom>
+            <a:noFill/>
+            <a:ln w="28575">
+              <a:solidFill>
+                <a:schemeClr val="tx1"/>
+              </a:solidFill>
+            </a:ln>
+          </p:spPr>
+          <p:style>
+            <a:lnRef idx="2">
+              <a:schemeClr val="accent1">
+                <a:shade val="50000"/>
+              </a:schemeClr>
+            </a:lnRef>
+            <a:fillRef idx="1">
+              <a:schemeClr val="accent1"/>
+            </a:fillRef>
+            <a:effectRef idx="0">
+              <a:schemeClr val="accent1"/>
+            </a:effectRef>
+            <a:fontRef idx="minor">
+              <a:schemeClr val="lt1"/>
+            </a:fontRef>
+          </p:style>
+          <p:txBody>
+            <a:bodyPr rtlCol="0" anchor="ctr"/>
+            <a:lstStyle/>
+            <a:p>
+              <a:pPr algn="ctr"/>
+              <a:endParaRPr lang="en-SG"/>
+            </a:p>
+          </p:txBody>
+        </p:sp>
+        <p:pic>
+          <p:nvPicPr>
+            <p:cNvPr id="36" name="Picture 35">
+              <a:extLst>
+                <a:ext uri="{FF2B5EF4-FFF2-40B4-BE49-F238E27FC236}">
+                  <a16:creationId xmlns:a16="http://schemas.microsoft.com/office/drawing/2014/main" id="{83EB9DFA-AF3B-4C03-B3A7-A27D629E5BB1}"/>
+                </a:ext>
+              </a:extLst>
+            </p:cNvPr>
+            <p:cNvPicPr>
+              <a:picLocks noChangeAspect="1"/>
+            </p:cNvPicPr>
+            <p:nvPr/>
+          </p:nvPicPr>
+          <p:blipFill>
+            <a:blip r:embed="rId7"/>
+            <a:stretch>
+              <a:fillRect/>
+            </a:stretch>
+          </p:blipFill>
+          <p:spPr>
+            <a:xfrm>
+              <a:off x="6565403" y="4339889"/>
+              <a:ext cx="5229226" cy="852526"/>
+            </a:xfrm>
+            <a:prstGeom prst="rect">
+              <a:avLst/>
+            </a:prstGeom>
+          </p:spPr>
+        </p:pic>
+        <p:cxnSp>
+          <p:nvCxnSpPr>
+            <p:cNvPr id="51" name="Straight Arrow Connector 50">
+              <a:extLst>
+                <a:ext uri="{FF2B5EF4-FFF2-40B4-BE49-F238E27FC236}">
+                  <a16:creationId xmlns:a16="http://schemas.microsoft.com/office/drawing/2014/main" id="{BA583AB9-E292-4F48-8D65-BD3E1135C366}"/>
+                </a:ext>
+              </a:extLst>
+            </p:cNvPr>
+            <p:cNvCxnSpPr>
+              <a:cxnSpLocks/>
+              <a:stCxn id="9" idx="2"/>
+              <a:endCxn id="5" idx="0"/>
+            </p:cNvCxnSpPr>
+            <p:nvPr/>
+          </p:nvCxnSpPr>
+          <p:spPr>
+            <a:xfrm>
+              <a:off x="3256975" y="2011126"/>
+              <a:ext cx="0" cy="1033150"/>
+            </a:xfrm>
+            <a:prstGeom prst="straightConnector1">
+              <a:avLst/>
+            </a:prstGeom>
+            <a:ln w="38100">
+              <a:tailEnd type="triangle"/>
+            </a:ln>
+          </p:spPr>
+          <p:style>
+            <a:lnRef idx="1">
+              <a:schemeClr val="accent1"/>
+            </a:lnRef>
+            <a:fillRef idx="0">
+              <a:schemeClr val="accent1"/>
+            </a:fillRef>
+            <a:effectRef idx="0">
+              <a:schemeClr val="accent1"/>
+            </a:effectRef>
+            <a:fontRef idx="minor">
+              <a:schemeClr val="tx1"/>
+            </a:fontRef>
+          </p:style>
+        </p:cxnSp>
+      </p:grpSp>
+    </p:spTree>
+    <p:extLst>
+      <p:ext uri="{BB962C8B-B14F-4D97-AF65-F5344CB8AC3E}">
+        <p14:creationId xmlns:p14="http://schemas.microsoft.com/office/powerpoint/2010/main" val="2331609847"/>
+      </p:ext>
+    </p:extLst>
+  </p:cSld>
+  <p:clrMapOvr>
+    <a:masterClrMapping/>
+  </p:clrMapOvr>
+</p:sld>
+</file>
+
+<file path=ppt/slides/slide6.xml><?xml version="1.0" encoding="utf-8"?>
+<p:sld xmlns:a="http://schemas.openxmlformats.org/drawingml/2006/main" xmlns:r="http://schemas.openxmlformats.org/officeDocument/2006/relationships" xmlns:p="http://schemas.openxmlformats.org/presentationml/2006/main">
+  <p:cSld>
+    <p:spTree>
+      <p:nvGrpSpPr>
+        <p:cNvPr id="1" name=""/>
+        <p:cNvGrpSpPr/>
+        <p:nvPr/>
+      </p:nvGrpSpPr>
+      <p:grpSpPr>
+        <a:xfrm>
+          <a:off x="0" y="0"/>
+          <a:ext cx="0" cy="0"/>
+          <a:chOff x="0" y="0"/>
+          <a:chExt cx="0" cy="0"/>
+        </a:xfrm>
+      </p:grpSpPr>
+      <p:grpSp>
+        <p:nvGrpSpPr>
           <p:cNvPr id="6" name="Group 5">
             <a:extLst>
               <a:ext uri="{FF2B5EF4-FFF2-40B4-BE49-F238E27FC236}">
@@ -4250,7 +6057,7 @@
 </p:sld>
 </file>
 
-<file path=ppt/slides/slide5.xml><?xml version="1.0" encoding="utf-8"?>
+<file path=ppt/slides/slide7.xml><?xml version="1.0" encoding="utf-8"?>
 <p:sld xmlns:a="http://schemas.openxmlformats.org/drawingml/2006/main" xmlns:r="http://schemas.openxmlformats.org/officeDocument/2006/relationships" xmlns:p="http://schemas.openxmlformats.org/presentationml/2006/main">
   <p:cSld>
     <p:spTree>
@@ -4625,7 +6432,7 @@
 </p:sld>
 </file>
 
-<file path=ppt/slides/slide6.xml><?xml version="1.0" encoding="utf-8"?>
+<file path=ppt/slides/slide8.xml><?xml version="1.0" encoding="utf-8"?>
 <p:sld xmlns:a="http://schemas.openxmlformats.org/drawingml/2006/main" xmlns:r="http://schemas.openxmlformats.org/officeDocument/2006/relationships" xmlns:p="http://schemas.openxmlformats.org/presentationml/2006/main">
   <p:cSld>
     <p:spTree>
@@ -5070,7 +6877,7 @@
 </p:sld>
 </file>
 
-<file path=ppt/slides/slide7.xml><?xml version="1.0" encoding="utf-8"?>
+<file path=ppt/slides/slide9.xml><?xml version="1.0" encoding="utf-8"?>
 <p:sld xmlns:a="http://schemas.openxmlformats.org/drawingml/2006/main" xmlns:r="http://schemas.openxmlformats.org/officeDocument/2006/relationships" xmlns:p="http://schemas.openxmlformats.org/presentationml/2006/main">
   <p:cSld>
     <p:spTree>
@@ -5426,947 +7233,6 @@
     <p:extLst>
       <p:ext uri="{BB962C8B-B14F-4D97-AF65-F5344CB8AC3E}">
         <p14:creationId xmlns:p14="http://schemas.microsoft.com/office/powerpoint/2010/main" val="37077707"/>
-      </p:ext>
-    </p:extLst>
-  </p:cSld>
-  <p:clrMapOvr>
-    <a:masterClrMapping/>
-  </p:clrMapOvr>
-</p:sld>
-</file>
-
-<file path=ppt/slides/slide8.xml><?xml version="1.0" encoding="utf-8"?>
-<p:sld xmlns:a="http://schemas.openxmlformats.org/drawingml/2006/main" xmlns:r="http://schemas.openxmlformats.org/officeDocument/2006/relationships" xmlns:p="http://schemas.openxmlformats.org/presentationml/2006/main">
-  <p:cSld>
-    <p:spTree>
-      <p:nvGrpSpPr>
-        <p:cNvPr id="1" name=""/>
-        <p:cNvGrpSpPr/>
-        <p:nvPr/>
-      </p:nvGrpSpPr>
-      <p:grpSpPr>
-        <a:xfrm>
-          <a:off x="0" y="0"/>
-          <a:ext cx="0" cy="0"/>
-          <a:chOff x="0" y="0"/>
-          <a:chExt cx="0" cy="0"/>
-        </a:xfrm>
-      </p:grpSpPr>
-      <p:grpSp>
-        <p:nvGrpSpPr>
-          <p:cNvPr id="57" name="Group 56">
-            <a:extLst>
-              <a:ext uri="{FF2B5EF4-FFF2-40B4-BE49-F238E27FC236}">
-                <a16:creationId xmlns:a16="http://schemas.microsoft.com/office/drawing/2014/main" id="{BCCB7538-95CD-4ED8-8760-D7FB21C83BA2}"/>
-              </a:ext>
-            </a:extLst>
-          </p:cNvPr>
-          <p:cNvGrpSpPr/>
-          <p:nvPr/>
-        </p:nvGrpSpPr>
-        <p:grpSpPr>
-          <a:xfrm>
-            <a:off x="361367" y="248825"/>
-            <a:ext cx="11504061" cy="5336996"/>
-            <a:chOff x="361367" y="248825"/>
-            <a:chExt cx="11504061" cy="5336996"/>
-          </a:xfrm>
-        </p:grpSpPr>
-        <p:pic>
-          <p:nvPicPr>
-            <p:cNvPr id="10" name="Picture 9">
-              <a:extLst>
-                <a:ext uri="{FF2B5EF4-FFF2-40B4-BE49-F238E27FC236}">
-                  <a16:creationId xmlns:a16="http://schemas.microsoft.com/office/drawing/2014/main" id="{36DADDEF-470D-4D10-80FF-455ABD0C014A}"/>
-                </a:ext>
-              </a:extLst>
-            </p:cNvPr>
-            <p:cNvPicPr>
-              <a:picLocks noChangeAspect="1"/>
-            </p:cNvPicPr>
-            <p:nvPr/>
-          </p:nvPicPr>
-          <p:blipFill>
-            <a:blip r:embed="rId2"/>
-            <a:stretch>
-              <a:fillRect/>
-            </a:stretch>
-          </p:blipFill>
-          <p:spPr>
-            <a:xfrm>
-              <a:off x="1431925" y="2387086"/>
-              <a:ext cx="2886075" cy="361950"/>
-            </a:xfrm>
-            <a:prstGeom prst="rect">
-              <a:avLst/>
-            </a:prstGeom>
-          </p:spPr>
-        </p:pic>
-        <p:sp>
-          <p:nvSpPr>
-            <p:cNvPr id="11" name="TextBox 10">
-              <a:extLst>
-                <a:ext uri="{FF2B5EF4-FFF2-40B4-BE49-F238E27FC236}">
-                  <a16:creationId xmlns:a16="http://schemas.microsoft.com/office/drawing/2014/main" id="{ECF5BEF1-64E7-40F0-BFB5-BF82F1DC814C}"/>
-                </a:ext>
-              </a:extLst>
-            </p:cNvPr>
-            <p:cNvSpPr txBox="1"/>
-            <p:nvPr/>
-          </p:nvSpPr>
-          <p:spPr>
-            <a:xfrm>
-              <a:off x="5817340" y="3347903"/>
-              <a:ext cx="1078992" cy="369332"/>
-            </a:xfrm>
-            <a:prstGeom prst="rect">
-              <a:avLst/>
-            </a:prstGeom>
-            <a:noFill/>
-          </p:spPr>
-          <p:txBody>
-            <a:bodyPr wrap="square" rtlCol="0">
-              <a:spAutoFit/>
-            </a:bodyPr>
-            <a:lstStyle/>
-            <a:p>
-              <a:pPr algn="ctr"/>
-              <a:r>
-                <a:rPr lang="en-SG" dirty="0"/>
-                <a:t>equals</a:t>
-              </a:r>
-            </a:p>
-          </p:txBody>
-        </p:sp>
-        <p:pic>
-          <p:nvPicPr>
-            <p:cNvPr id="15" name="Picture 14">
-              <a:extLst>
-                <a:ext uri="{FF2B5EF4-FFF2-40B4-BE49-F238E27FC236}">
-                  <a16:creationId xmlns:a16="http://schemas.microsoft.com/office/drawing/2014/main" id="{36289DBE-5F83-4978-AC1F-5080B647A643}"/>
-                </a:ext>
-              </a:extLst>
-            </p:cNvPr>
-            <p:cNvPicPr>
-              <a:picLocks noChangeAspect="1"/>
-            </p:cNvPicPr>
-            <p:nvPr/>
-          </p:nvPicPr>
-          <p:blipFill>
-            <a:blip r:embed="rId3">
-              <a:extLst>
-                <a:ext uri="{28A0092B-C50C-407E-A947-70E740481C1C}">
-                  <a14:useLocalDpi xmlns:a14="http://schemas.microsoft.com/office/drawing/2010/main" val="0"/>
-                </a:ext>
-              </a:extLst>
-            </a:blip>
-            <a:stretch>
-              <a:fillRect/>
-            </a:stretch>
-          </p:blipFill>
-          <p:spPr>
-            <a:xfrm>
-              <a:off x="1352310" y="248825"/>
-              <a:ext cx="3583242" cy="1048754"/>
-            </a:xfrm>
-            <a:prstGeom prst="rect">
-              <a:avLst/>
-            </a:prstGeom>
-          </p:spPr>
-        </p:pic>
-        <p:sp>
-          <p:nvSpPr>
-            <p:cNvPr id="16" name="Rectangle 15">
-              <a:extLst>
-                <a:ext uri="{FF2B5EF4-FFF2-40B4-BE49-F238E27FC236}">
-                  <a16:creationId xmlns:a16="http://schemas.microsoft.com/office/drawing/2014/main" id="{9BB992B6-E49B-45DB-8B30-36AAD9504F4D}"/>
-                </a:ext>
-              </a:extLst>
-            </p:cNvPr>
-            <p:cNvSpPr/>
-            <p:nvPr/>
-          </p:nvSpPr>
-          <p:spPr>
-            <a:xfrm>
-              <a:off x="3463227" y="2451094"/>
-              <a:ext cx="694944" cy="217066"/>
-            </a:xfrm>
-            <a:prstGeom prst="rect">
-              <a:avLst/>
-            </a:prstGeom>
-            <a:noFill/>
-            <a:ln w="28575">
-              <a:solidFill>
-                <a:srgbClr val="FF66FF"/>
-              </a:solidFill>
-            </a:ln>
-          </p:spPr>
-          <p:style>
-            <a:lnRef idx="2">
-              <a:schemeClr val="accent1">
-                <a:shade val="50000"/>
-              </a:schemeClr>
-            </a:lnRef>
-            <a:fillRef idx="1">
-              <a:schemeClr val="accent1"/>
-            </a:fillRef>
-            <a:effectRef idx="0">
-              <a:schemeClr val="accent1"/>
-            </a:effectRef>
-            <a:fontRef idx="minor">
-              <a:schemeClr val="lt1"/>
-            </a:fontRef>
-          </p:style>
-          <p:txBody>
-            <a:bodyPr rtlCol="0" anchor="ctr"/>
-            <a:lstStyle/>
-            <a:p>
-              <a:pPr algn="ctr"/>
-              <a:endParaRPr lang="en-SG">
-                <a:solidFill>
-                  <a:srgbClr val="FF66FF"/>
-                </a:solidFill>
-              </a:endParaRPr>
-            </a:p>
-          </p:txBody>
-        </p:sp>
-        <p:pic>
-          <p:nvPicPr>
-            <p:cNvPr id="3" name="Picture 2">
-              <a:extLst>
-                <a:ext uri="{FF2B5EF4-FFF2-40B4-BE49-F238E27FC236}">
-                  <a16:creationId xmlns:a16="http://schemas.microsoft.com/office/drawing/2014/main" id="{E8B70E49-69BA-451F-B783-110E481BFDE2}"/>
-                </a:ext>
-              </a:extLst>
-            </p:cNvPr>
-            <p:cNvPicPr>
-              <a:picLocks noChangeAspect="1"/>
-            </p:cNvPicPr>
-            <p:nvPr/>
-          </p:nvPicPr>
-          <p:blipFill>
-            <a:blip r:embed="rId4"/>
-            <a:stretch>
-              <a:fillRect/>
-            </a:stretch>
-          </p:blipFill>
-          <p:spPr>
-            <a:xfrm>
-              <a:off x="361367" y="2856927"/>
-              <a:ext cx="5353050" cy="1809750"/>
-            </a:xfrm>
-            <a:prstGeom prst="rect">
-              <a:avLst/>
-            </a:prstGeom>
-          </p:spPr>
-        </p:pic>
-        <p:pic>
-          <p:nvPicPr>
-            <p:cNvPr id="5" name="Picture 4">
-              <a:extLst>
-                <a:ext uri="{FF2B5EF4-FFF2-40B4-BE49-F238E27FC236}">
-                  <a16:creationId xmlns:a16="http://schemas.microsoft.com/office/drawing/2014/main" id="{FD8D545B-D184-4048-AEB9-EE398BF09053}"/>
-                </a:ext>
-              </a:extLst>
-            </p:cNvPr>
-            <p:cNvPicPr>
-              <a:picLocks noChangeAspect="1"/>
-            </p:cNvPicPr>
-            <p:nvPr/>
-          </p:nvPicPr>
-          <p:blipFill>
-            <a:blip r:embed="rId5"/>
-            <a:stretch>
-              <a:fillRect/>
-            </a:stretch>
-          </p:blipFill>
-          <p:spPr>
-            <a:xfrm>
-              <a:off x="7777375" y="248825"/>
-              <a:ext cx="3589069" cy="1048754"/>
-            </a:xfrm>
-            <a:prstGeom prst="rect">
-              <a:avLst/>
-            </a:prstGeom>
-          </p:spPr>
-        </p:pic>
-        <p:pic>
-          <p:nvPicPr>
-            <p:cNvPr id="9" name="Picture 8">
-              <a:extLst>
-                <a:ext uri="{FF2B5EF4-FFF2-40B4-BE49-F238E27FC236}">
-                  <a16:creationId xmlns:a16="http://schemas.microsoft.com/office/drawing/2014/main" id="{FCC9DCB3-60E2-4D2C-8EC1-B1053102A16D}"/>
-                </a:ext>
-              </a:extLst>
-            </p:cNvPr>
-            <p:cNvPicPr>
-              <a:picLocks noChangeAspect="1"/>
-            </p:cNvPicPr>
-            <p:nvPr/>
-          </p:nvPicPr>
-          <p:blipFill>
-            <a:blip r:embed="rId6"/>
-            <a:stretch>
-              <a:fillRect/>
-            </a:stretch>
-          </p:blipFill>
-          <p:spPr>
-            <a:xfrm>
-              <a:off x="7143652" y="3945351"/>
-              <a:ext cx="4721776" cy="1640470"/>
-            </a:xfrm>
-            <a:prstGeom prst="rect">
-              <a:avLst/>
-            </a:prstGeom>
-            <a:ln w="38100">
-              <a:solidFill>
-                <a:srgbClr val="FF66FF"/>
-              </a:solidFill>
-            </a:ln>
-          </p:spPr>
-        </p:pic>
-        <p:pic>
-          <p:nvPicPr>
-            <p:cNvPr id="12" name="Picture 11">
-              <a:extLst>
-                <a:ext uri="{FF2B5EF4-FFF2-40B4-BE49-F238E27FC236}">
-                  <a16:creationId xmlns:a16="http://schemas.microsoft.com/office/drawing/2014/main" id="{FB95CB6C-0967-48AB-8207-EBB0D074BA27}"/>
-                </a:ext>
-              </a:extLst>
-            </p:cNvPr>
-            <p:cNvPicPr>
-              <a:picLocks noChangeAspect="1"/>
-            </p:cNvPicPr>
-            <p:nvPr/>
-          </p:nvPicPr>
-          <p:blipFill>
-            <a:blip r:embed="rId7"/>
-            <a:stretch>
-              <a:fillRect/>
-            </a:stretch>
-          </p:blipFill>
-          <p:spPr>
-            <a:xfrm>
-              <a:off x="7143652" y="1571396"/>
-              <a:ext cx="4686981" cy="1631380"/>
-            </a:xfrm>
-            <a:prstGeom prst="rect">
-              <a:avLst/>
-            </a:prstGeom>
-          </p:spPr>
-        </p:pic>
-        <p:sp>
-          <p:nvSpPr>
-            <p:cNvPr id="13" name="Rectangle 12">
-              <a:extLst>
-                <a:ext uri="{FF2B5EF4-FFF2-40B4-BE49-F238E27FC236}">
-                  <a16:creationId xmlns:a16="http://schemas.microsoft.com/office/drawing/2014/main" id="{BD136409-3B82-4B65-A9A9-6A694EC94597}"/>
-                </a:ext>
-              </a:extLst>
-            </p:cNvPr>
-            <p:cNvSpPr/>
-            <p:nvPr/>
-          </p:nvSpPr>
-          <p:spPr>
-            <a:xfrm>
-              <a:off x="10511959" y="1571396"/>
-              <a:ext cx="1318673" cy="1375004"/>
-            </a:xfrm>
-            <a:prstGeom prst="rect">
-              <a:avLst/>
-            </a:prstGeom>
-            <a:noFill/>
-            <a:ln w="28575">
-              <a:solidFill>
-                <a:schemeClr val="accent4">
-                  <a:lumMod val="75000"/>
-                </a:schemeClr>
-              </a:solidFill>
-            </a:ln>
-          </p:spPr>
-          <p:style>
-            <a:lnRef idx="2">
-              <a:schemeClr val="accent1">
-                <a:shade val="50000"/>
-              </a:schemeClr>
-            </a:lnRef>
-            <a:fillRef idx="1">
-              <a:schemeClr val="accent1"/>
-            </a:fillRef>
-            <a:effectRef idx="0">
-              <a:schemeClr val="accent1"/>
-            </a:effectRef>
-            <a:fontRef idx="minor">
-              <a:schemeClr val="lt1"/>
-            </a:fontRef>
-          </p:style>
-          <p:txBody>
-            <a:bodyPr rtlCol="0" anchor="ctr"/>
-            <a:lstStyle/>
-            <a:p>
-              <a:pPr algn="ctr"/>
-              <a:endParaRPr lang="en-SG"/>
-            </a:p>
-          </p:txBody>
-        </p:sp>
-        <p:sp>
-          <p:nvSpPr>
-            <p:cNvPr id="18" name="Rectangle 17">
-              <a:extLst>
-                <a:ext uri="{FF2B5EF4-FFF2-40B4-BE49-F238E27FC236}">
-                  <a16:creationId xmlns:a16="http://schemas.microsoft.com/office/drawing/2014/main" id="{975AC692-014B-4EF3-AAB4-5F5632C09598}"/>
-                </a:ext>
-              </a:extLst>
-            </p:cNvPr>
-            <p:cNvSpPr/>
-            <p:nvPr/>
-          </p:nvSpPr>
-          <p:spPr>
-            <a:xfrm>
-              <a:off x="3207657" y="928914"/>
-              <a:ext cx="1226286" cy="246743"/>
-            </a:xfrm>
-            <a:prstGeom prst="rect">
-              <a:avLst/>
-            </a:prstGeom>
-            <a:noFill/>
-            <a:ln w="28575">
-              <a:solidFill>
-                <a:srgbClr val="FF66FF"/>
-              </a:solidFill>
-            </a:ln>
-          </p:spPr>
-          <p:style>
-            <a:lnRef idx="2">
-              <a:schemeClr val="accent1">
-                <a:shade val="50000"/>
-              </a:schemeClr>
-            </a:lnRef>
-            <a:fillRef idx="1">
-              <a:schemeClr val="accent1"/>
-            </a:fillRef>
-            <a:effectRef idx="0">
-              <a:schemeClr val="accent1"/>
-            </a:effectRef>
-            <a:fontRef idx="minor">
-              <a:schemeClr val="lt1"/>
-            </a:fontRef>
-          </p:style>
-          <p:txBody>
-            <a:bodyPr rtlCol="0" anchor="ctr"/>
-            <a:lstStyle/>
-            <a:p>
-              <a:pPr algn="ctr"/>
-              <a:endParaRPr lang="en-SG">
-                <a:solidFill>
-                  <a:srgbClr val="FF66FF"/>
-                </a:solidFill>
-              </a:endParaRPr>
-            </a:p>
-          </p:txBody>
-        </p:sp>
-        <p:cxnSp>
-          <p:nvCxnSpPr>
-            <p:cNvPr id="20" name="Straight Arrow Connector 19">
-              <a:extLst>
-                <a:ext uri="{FF2B5EF4-FFF2-40B4-BE49-F238E27FC236}">
-                  <a16:creationId xmlns:a16="http://schemas.microsoft.com/office/drawing/2014/main" id="{9CAD71E1-606A-4381-8051-B08D2AB48614}"/>
-                </a:ext>
-              </a:extLst>
-            </p:cNvPr>
-            <p:cNvCxnSpPr>
-              <a:cxnSpLocks/>
-              <a:stCxn id="18" idx="2"/>
-              <a:endCxn id="16" idx="0"/>
-            </p:cNvCxnSpPr>
-            <p:nvPr/>
-          </p:nvCxnSpPr>
-          <p:spPr>
-            <a:xfrm flipH="1">
-              <a:off x="3810699" y="1175657"/>
-              <a:ext cx="10101" cy="1275437"/>
-            </a:xfrm>
-            <a:prstGeom prst="straightConnector1">
-              <a:avLst/>
-            </a:prstGeom>
-            <a:ln w="28575">
-              <a:solidFill>
-                <a:srgbClr val="FF66FF"/>
-              </a:solidFill>
-              <a:tailEnd type="triangle"/>
-            </a:ln>
-          </p:spPr>
-          <p:style>
-            <a:lnRef idx="1">
-              <a:schemeClr val="accent1"/>
-            </a:lnRef>
-            <a:fillRef idx="0">
-              <a:schemeClr val="accent1"/>
-            </a:fillRef>
-            <a:effectRef idx="0">
-              <a:schemeClr val="accent1"/>
-            </a:effectRef>
-            <a:fontRef idx="minor">
-              <a:schemeClr val="tx1"/>
-            </a:fontRef>
-          </p:style>
-        </p:cxnSp>
-        <p:cxnSp>
-          <p:nvCxnSpPr>
-            <p:cNvPr id="22" name="Straight Arrow Connector 21">
-              <a:extLst>
-                <a:ext uri="{FF2B5EF4-FFF2-40B4-BE49-F238E27FC236}">
-                  <a16:creationId xmlns:a16="http://schemas.microsoft.com/office/drawing/2014/main" id="{13030DD6-F103-4091-B3C0-391EC46478D4}"/>
-                </a:ext>
-              </a:extLst>
-            </p:cNvPr>
-            <p:cNvCxnSpPr>
-              <a:cxnSpLocks/>
-            </p:cNvCxnSpPr>
-            <p:nvPr/>
-          </p:nvCxnSpPr>
-          <p:spPr>
-            <a:xfrm>
-              <a:off x="11171296" y="2946400"/>
-              <a:ext cx="0" cy="965201"/>
-            </a:xfrm>
-            <a:prstGeom prst="straightConnector1">
-              <a:avLst/>
-            </a:prstGeom>
-            <a:ln w="38100">
-              <a:solidFill>
-                <a:schemeClr val="accent4">
-                  <a:lumMod val="75000"/>
-                </a:schemeClr>
-              </a:solidFill>
-              <a:tailEnd type="triangle"/>
-            </a:ln>
-          </p:spPr>
-          <p:style>
-            <a:lnRef idx="1">
-              <a:schemeClr val="accent1"/>
-            </a:lnRef>
-            <a:fillRef idx="0">
-              <a:schemeClr val="accent1"/>
-            </a:fillRef>
-            <a:effectRef idx="0">
-              <a:schemeClr val="accent1"/>
-            </a:effectRef>
-            <a:fontRef idx="minor">
-              <a:schemeClr val="tx1"/>
-            </a:fontRef>
-          </p:style>
-        </p:cxnSp>
-        <p:cxnSp>
-          <p:nvCxnSpPr>
-            <p:cNvPr id="30" name="Straight Arrow Connector 29">
-              <a:extLst>
-                <a:ext uri="{FF2B5EF4-FFF2-40B4-BE49-F238E27FC236}">
-                  <a16:creationId xmlns:a16="http://schemas.microsoft.com/office/drawing/2014/main" id="{90067718-78A6-4CBD-B92A-C17A78E6878E}"/>
-                </a:ext>
-              </a:extLst>
-            </p:cNvPr>
-            <p:cNvCxnSpPr>
-              <a:cxnSpLocks/>
-              <a:stCxn id="13" idx="2"/>
-            </p:cNvCxnSpPr>
-            <p:nvPr/>
-          </p:nvCxnSpPr>
-          <p:spPr>
-            <a:xfrm flipH="1">
-              <a:off x="9278583" y="2946400"/>
-              <a:ext cx="1892713" cy="965201"/>
-            </a:xfrm>
-            <a:prstGeom prst="straightConnector1">
-              <a:avLst/>
-            </a:prstGeom>
-            <a:ln w="38100">
-              <a:solidFill>
-                <a:schemeClr val="accent4">
-                  <a:lumMod val="75000"/>
-                </a:schemeClr>
-              </a:solidFill>
-              <a:tailEnd type="triangle"/>
-            </a:ln>
-          </p:spPr>
-          <p:style>
-            <a:lnRef idx="1">
-              <a:schemeClr val="accent1"/>
-            </a:lnRef>
-            <a:fillRef idx="0">
-              <a:schemeClr val="accent1"/>
-            </a:fillRef>
-            <a:effectRef idx="0">
-              <a:schemeClr val="accent1"/>
-            </a:effectRef>
-            <a:fontRef idx="minor">
-              <a:schemeClr val="tx1"/>
-            </a:fontRef>
-          </p:style>
-        </p:cxnSp>
-        <p:cxnSp>
-          <p:nvCxnSpPr>
-            <p:cNvPr id="35" name="Straight Arrow Connector 34">
-              <a:extLst>
-                <a:ext uri="{FF2B5EF4-FFF2-40B4-BE49-F238E27FC236}">
-                  <a16:creationId xmlns:a16="http://schemas.microsoft.com/office/drawing/2014/main" id="{7BC9051F-9781-49B3-B19A-355AA14AB1F7}"/>
-                </a:ext>
-              </a:extLst>
-            </p:cNvPr>
-            <p:cNvCxnSpPr>
-              <a:cxnSpLocks/>
-            </p:cNvCxnSpPr>
-            <p:nvPr/>
-          </p:nvCxnSpPr>
-          <p:spPr>
-            <a:xfrm flipH="1">
-              <a:off x="10224939" y="2954750"/>
-              <a:ext cx="946357" cy="956851"/>
-            </a:xfrm>
-            <a:prstGeom prst="straightConnector1">
-              <a:avLst/>
-            </a:prstGeom>
-            <a:ln w="38100">
-              <a:solidFill>
-                <a:schemeClr val="accent4">
-                  <a:lumMod val="75000"/>
-                </a:schemeClr>
-              </a:solidFill>
-              <a:tailEnd type="triangle"/>
-            </a:ln>
-          </p:spPr>
-          <p:style>
-            <a:lnRef idx="1">
-              <a:schemeClr val="accent1"/>
-            </a:lnRef>
-            <a:fillRef idx="0">
-              <a:schemeClr val="accent1"/>
-            </a:fillRef>
-            <a:effectRef idx="0">
-              <a:schemeClr val="accent1"/>
-            </a:effectRef>
-            <a:fontRef idx="minor">
-              <a:schemeClr val="tx1"/>
-            </a:fontRef>
-          </p:style>
-        </p:cxnSp>
-        <p:sp>
-          <p:nvSpPr>
-            <p:cNvPr id="8" name="TextBox 7">
-              <a:extLst>
-                <a:ext uri="{FF2B5EF4-FFF2-40B4-BE49-F238E27FC236}">
-                  <a16:creationId xmlns:a16="http://schemas.microsoft.com/office/drawing/2014/main" id="{A9B1E70A-427D-44EF-9CD9-1A6665FD1AC8}"/>
-                </a:ext>
-              </a:extLst>
-            </p:cNvPr>
-            <p:cNvSpPr txBox="1"/>
-            <p:nvPr/>
-          </p:nvSpPr>
-          <p:spPr>
-            <a:xfrm>
-              <a:off x="8700492" y="3291927"/>
-              <a:ext cx="1156179" cy="369332"/>
-            </a:xfrm>
-            <a:prstGeom prst="rect">
-              <a:avLst/>
-            </a:prstGeom>
-            <a:noFill/>
-          </p:spPr>
-          <p:txBody>
-            <a:bodyPr wrap="square" rtlCol="0">
-              <a:spAutoFit/>
-            </a:bodyPr>
-            <a:lstStyle/>
-            <a:p>
-              <a:pPr algn="ctr"/>
-              <a:r>
-                <a:rPr lang="en-SG" dirty="0"/>
-                <a:t>divided by</a:t>
-              </a:r>
-            </a:p>
-          </p:txBody>
-        </p:sp>
-        <p:cxnSp>
-          <p:nvCxnSpPr>
-            <p:cNvPr id="40" name="Connector: Elbow 39">
-              <a:extLst>
-                <a:ext uri="{FF2B5EF4-FFF2-40B4-BE49-F238E27FC236}">
-                  <a16:creationId xmlns:a16="http://schemas.microsoft.com/office/drawing/2014/main" id="{39F53C44-AA76-489A-BB17-A2056E652BFD}"/>
-                </a:ext>
-              </a:extLst>
-            </p:cNvPr>
-            <p:cNvCxnSpPr>
-              <a:cxnSpLocks/>
-            </p:cNvCxnSpPr>
-            <p:nvPr/>
-          </p:nvCxnSpPr>
-          <p:spPr>
-            <a:xfrm rot="10800000" flipH="1" flipV="1">
-              <a:off x="10756816" y="655710"/>
-              <a:ext cx="414480" cy="915685"/>
-            </a:xfrm>
-            <a:prstGeom prst="bentConnector4">
-              <a:avLst>
-                <a:gd name="adj1" fmla="val 100349"/>
-                <a:gd name="adj2" fmla="val 100910"/>
-              </a:avLst>
-            </a:prstGeom>
-            <a:ln w="19050">
-              <a:solidFill>
-                <a:schemeClr val="accent4">
-                  <a:lumMod val="75000"/>
-                </a:schemeClr>
-              </a:solidFill>
-              <a:tailEnd type="triangle"/>
-            </a:ln>
-          </p:spPr>
-          <p:style>
-            <a:lnRef idx="1">
-              <a:schemeClr val="accent1"/>
-            </a:lnRef>
-            <a:fillRef idx="0">
-              <a:schemeClr val="accent1"/>
-            </a:fillRef>
-            <a:effectRef idx="0">
-              <a:schemeClr val="accent1"/>
-            </a:effectRef>
-            <a:fontRef idx="minor">
-              <a:schemeClr val="tx1"/>
-            </a:fontRef>
-          </p:style>
-        </p:cxnSp>
-        <p:sp>
-          <p:nvSpPr>
-            <p:cNvPr id="43" name="Right Brace 42">
-              <a:extLst>
-                <a:ext uri="{FF2B5EF4-FFF2-40B4-BE49-F238E27FC236}">
-                  <a16:creationId xmlns:a16="http://schemas.microsoft.com/office/drawing/2014/main" id="{1BA38BDF-B1E9-4DB0-86AA-2132B21AEC86}"/>
-                </a:ext>
-              </a:extLst>
-            </p:cNvPr>
-            <p:cNvSpPr/>
-            <p:nvPr/>
-          </p:nvSpPr>
-          <p:spPr>
-            <a:xfrm>
-              <a:off x="10587193" y="448850"/>
-              <a:ext cx="169623" cy="413721"/>
-            </a:xfrm>
-            <a:prstGeom prst="rightBrace">
-              <a:avLst>
-                <a:gd name="adj1" fmla="val 0"/>
-                <a:gd name="adj2" fmla="val 50000"/>
-              </a:avLst>
-            </a:prstGeom>
-            <a:ln w="19050">
-              <a:solidFill>
-                <a:schemeClr val="accent4">
-                  <a:lumMod val="75000"/>
-                </a:schemeClr>
-              </a:solidFill>
-            </a:ln>
-          </p:spPr>
-          <p:style>
-            <a:lnRef idx="1">
-              <a:schemeClr val="accent1"/>
-            </a:lnRef>
-            <a:fillRef idx="0">
-              <a:schemeClr val="accent1"/>
-            </a:fillRef>
-            <a:effectRef idx="0">
-              <a:schemeClr val="accent1"/>
-            </a:effectRef>
-            <a:fontRef idx="minor">
-              <a:schemeClr val="tx1"/>
-            </a:fontRef>
-          </p:style>
-          <p:txBody>
-            <a:bodyPr rtlCol="0" anchor="ctr"/>
-            <a:lstStyle/>
-            <a:p>
-              <a:pPr algn="ctr"/>
-              <a:endParaRPr lang="en-SG"/>
-            </a:p>
-          </p:txBody>
-        </p:sp>
-      </p:grpSp>
-    </p:spTree>
-    <p:extLst>
-      <p:ext uri="{BB962C8B-B14F-4D97-AF65-F5344CB8AC3E}">
-        <p14:creationId xmlns:p14="http://schemas.microsoft.com/office/powerpoint/2010/main" val="1023774816"/>
-      </p:ext>
-    </p:extLst>
-  </p:cSld>
-  <p:clrMapOvr>
-    <a:masterClrMapping/>
-  </p:clrMapOvr>
-</p:sld>
-</file>
-
-<file path=ppt/slides/slide9.xml><?xml version="1.0" encoding="utf-8"?>
-<p:sld xmlns:a="http://schemas.openxmlformats.org/drawingml/2006/main" xmlns:r="http://schemas.openxmlformats.org/officeDocument/2006/relationships" xmlns:p="http://schemas.openxmlformats.org/presentationml/2006/main">
-  <p:cSld>
-    <p:spTree>
-      <p:nvGrpSpPr>
-        <p:cNvPr id="1" name=""/>
-        <p:cNvGrpSpPr/>
-        <p:nvPr/>
-      </p:nvGrpSpPr>
-      <p:grpSpPr>
-        <a:xfrm>
-          <a:off x="0" y="0"/>
-          <a:ext cx="0" cy="0"/>
-          <a:chOff x="0" y="0"/>
-          <a:chExt cx="0" cy="0"/>
-        </a:xfrm>
-      </p:grpSpPr>
-      <p:sp>
-        <p:nvSpPr>
-          <p:cNvPr id="6" name="TextBox 5">
-            <a:extLst>
-              <a:ext uri="{FF2B5EF4-FFF2-40B4-BE49-F238E27FC236}">
-                <a16:creationId xmlns:a16="http://schemas.microsoft.com/office/drawing/2014/main" id="{A94533D7-0ACE-451E-8D9A-67D53D4E184D}"/>
-              </a:ext>
-            </a:extLst>
-          </p:cNvPr>
-          <p:cNvSpPr txBox="1"/>
-          <p:nvPr/>
-        </p:nvSpPr>
-        <p:spPr>
-          <a:xfrm>
-            <a:off x="1013971" y="1155302"/>
-            <a:ext cx="2621744" cy="369332"/>
-          </a:xfrm>
-          <a:prstGeom prst="rect">
-            <a:avLst/>
-          </a:prstGeom>
-          <a:noFill/>
-        </p:spPr>
-        <p:txBody>
-          <a:bodyPr wrap="square" rtlCol="0">
-            <a:spAutoFit/>
-          </a:bodyPr>
-          <a:lstStyle/>
-          <a:p>
-            <a:r>
-              <a:rPr lang="en-SG" dirty="0"/>
-              <a:t>Tutorial: </a:t>
-            </a:r>
-            <a:r>
-              <a:rPr lang="en-SG" dirty="0" err="1"/>
-              <a:t>Github</a:t>
-            </a:r>
-            <a:r>
-              <a:rPr lang="en-SG" dirty="0"/>
-              <a:t> README</a:t>
-            </a:r>
-          </a:p>
-        </p:txBody>
-      </p:sp>
-      <p:sp>
-        <p:nvSpPr>
-          <p:cNvPr id="7" name="TextBox 6">
-            <a:extLst>
-              <a:ext uri="{FF2B5EF4-FFF2-40B4-BE49-F238E27FC236}">
-                <a16:creationId xmlns:a16="http://schemas.microsoft.com/office/drawing/2014/main" id="{17B81847-2442-445B-8F92-18BFB1D2FFB8}"/>
-              </a:ext>
-            </a:extLst>
-          </p:cNvPr>
-          <p:cNvSpPr txBox="1"/>
-          <p:nvPr/>
-        </p:nvSpPr>
-        <p:spPr>
-          <a:xfrm>
-            <a:off x="5784718" y="1155302"/>
-            <a:ext cx="2621744" cy="369332"/>
-          </a:xfrm>
-          <a:prstGeom prst="rect">
-            <a:avLst/>
-          </a:prstGeom>
-          <a:noFill/>
-        </p:spPr>
-        <p:txBody>
-          <a:bodyPr wrap="square" rtlCol="0">
-            <a:spAutoFit/>
-          </a:bodyPr>
-          <a:lstStyle/>
-          <a:p>
-            <a:r>
-              <a:rPr lang="en-SG" dirty="0"/>
-              <a:t>How to guide: </a:t>
-            </a:r>
-            <a:r>
-              <a:rPr lang="en-SG" dirty="0" err="1"/>
-              <a:t>Cheatsheet</a:t>
-            </a:r>
-            <a:endParaRPr lang="en-SG" dirty="0"/>
-          </a:p>
-        </p:txBody>
-      </p:sp>
-      <p:pic>
-        <p:nvPicPr>
-          <p:cNvPr id="2" name="Picture 1">
-            <a:extLst>
-              <a:ext uri="{FF2B5EF4-FFF2-40B4-BE49-F238E27FC236}">
-                <a16:creationId xmlns:a16="http://schemas.microsoft.com/office/drawing/2014/main" id="{7CF9116E-898D-4FCE-936A-C57069E8F1D8}"/>
-              </a:ext>
-            </a:extLst>
-          </p:cNvPr>
-          <p:cNvPicPr>
-            <a:picLocks noChangeAspect="1"/>
-          </p:cNvPicPr>
-          <p:nvPr/>
-        </p:nvPicPr>
-        <p:blipFill>
-          <a:blip r:embed="rId2"/>
-          <a:stretch>
-            <a:fillRect/>
-          </a:stretch>
-        </p:blipFill>
-        <p:spPr>
-          <a:xfrm>
-            <a:off x="218171" y="1524634"/>
-            <a:ext cx="6835087" cy="4774566"/>
-          </a:xfrm>
-          <a:prstGeom prst="rect">
-            <a:avLst/>
-          </a:prstGeom>
-        </p:spPr>
-      </p:pic>
-      <p:pic>
-        <p:nvPicPr>
-          <p:cNvPr id="3" name="Picture 2">
-            <a:extLst>
-              <a:ext uri="{FF2B5EF4-FFF2-40B4-BE49-F238E27FC236}">
-                <a16:creationId xmlns:a16="http://schemas.microsoft.com/office/drawing/2014/main" id="{B3DD51C1-A30E-40E4-BCAD-88F940928DFF}"/>
-              </a:ext>
-            </a:extLst>
-          </p:cNvPr>
-          <p:cNvPicPr>
-            <a:picLocks noChangeAspect="1"/>
-          </p:cNvPicPr>
-          <p:nvPr/>
-        </p:nvPicPr>
-        <p:blipFill>
-          <a:blip r:embed="rId3"/>
-          <a:stretch>
-            <a:fillRect/>
-          </a:stretch>
-        </p:blipFill>
-        <p:spPr>
-          <a:xfrm>
-            <a:off x="4194594" y="1893966"/>
-            <a:ext cx="7348873" cy="4159489"/>
-          </a:xfrm>
-          <a:prstGeom prst="rect">
-            <a:avLst/>
-          </a:prstGeom>
-        </p:spPr>
-      </p:pic>
-    </p:spTree>
-    <p:extLst>
-      <p:ext uri="{BB962C8B-B14F-4D97-AF65-F5344CB8AC3E}">
-        <p14:creationId xmlns:p14="http://schemas.microsoft.com/office/powerpoint/2010/main" val="81797160"/>
       </p:ext>
     </p:extLst>
   </p:cSld>

</xml_diff>